<commit_message>
Fix Implementation Approach timeline formatting in solution briefings
Remove markdown italic syntax from phase timelines to prevent asterisks appearing in PowerPoint presentations.

Changed from: **Phase 1: Pilot** *(Months 1-2)*
Changed to: **Phase 1: Pilot (Months 1-2)**

Applied to all 3 AWS solutions:
- AWS Intelligent Document Processing
- AWS Disaster Recovery for Web Applications
- AWS Cloud Migration - On-Premise to Cloud

Regenerated all solution-briefing.pptx files with corrected formatting.
</commit_message>
<xml_diff>
--- a/solutions/aws/ai/intelligent-document-processing/presales/solution-briefing.pptx
+++ b/solutions/aws/ai/intelligent-document-processing/presales/solution-briefing.pptx
@@ -3917,10 +3917,7 @@
             <a:pPr/>
             <a:r>
               <a:rPr b="1"/>
-              <a:t>Phase 1: Pilot</a:t>
-            </a:r>
-            <a:r>
-              <a:t> *(Months 1-2)*</a:t>
+              <a:t>Phase 1: Pilot (Months 1-2)</a:t>
             </a:r>
           </a:p>
           <a:p>
@@ -3945,10 +3942,7 @@
             <a:pPr/>
             <a:r>
               <a:rPr b="1"/>
-              <a:t>Phase 2: Expansion</a:t>
-            </a:r>
-            <a:r>
-              <a:t> *(Months 3-4)*</a:t>
+              <a:t>Phase 2: Expansion (Months 3-4)</a:t>
             </a:r>
           </a:p>
           <a:p>
@@ -3973,10 +3967,7 @@
             <a:pPr/>
             <a:r>
               <a:rPr b="1"/>
-              <a:t>Phase 3: Optimization</a:t>
-            </a:r>
-            <a:r>
-              <a:t> *(Months 5-6)*</a:t>
+              <a:t>Phase 3: Optimization (Months 5-6)</a:t>
             </a:r>
           </a:p>
           <a:p>

</xml_diff>

<commit_message>
Add Engagement Scope slides with solution-specific scope for AWS solutions
- Intelligent Document Processing: IDP-specific scope (document types, AI/ML complexity, accuracy targets)
- Disaster Recovery: DR-specific scope (RTO/RPO, failover, multi-region)
- On-premises Migration: Migration-specific scope (workloads, strategy, hybrid connectivity)
- Updated LOE CSVs with Current Scope column and solution-tailored parameters
- Regenerated PPTX files with 11-slide structure including Engagement Scope
</commit_message>
<xml_diff>
--- a/solutions/aws/ai/intelligent-document-processing/presales/solution-briefing.pptx
+++ b/solutions/aws/ai/intelligent-document-processing/presales/solution-briefing.pptx
@@ -18,6 +18,7 @@
     <p:sldId id="263" r:id="rId14"/>
     <p:sldId id="264" r:id="rId15"/>
     <p:sldId id="265" r:id="rId16"/>
+    <p:sldId id="266" r:id="rId17"/>
   </p:sldIdLst>
   <p:sldSz cx="9144000" cy="5143500" type="screen16x9"/>
   <p:notesSz cx="5143500" cy="9144000"/>
@@ -3360,7 +3361,7 @@
           <a:lstStyle/>
           <a:p>
             <a:r>
-              <a:t>[Presenter Name] | November 15, 2025</a:t>
+              <a:t>[Presenter Name] | November 16, 2025</a:t>
             </a:r>
           </a:p>
         </p:txBody>
@@ -3398,6 +3399,174 @@
 </file>
 
 <file path=ppt/slides/slide10.xml><?xml version="1.0" encoding="utf-8"?>
+<p:sld xmlns:a="http://schemas.openxmlformats.org/drawingml/2006/main" xmlns:p="http://schemas.openxmlformats.org/presentationml/2006/main" xmlns:r="http://schemas.openxmlformats.org/officeDocument/2006/relationships">
+  <p:cSld>
+    <p:spTree>
+      <p:nvGrpSpPr>
+        <p:cNvPr id="1" name=""/>
+        <p:cNvGrpSpPr/>
+        <p:nvPr/>
+      </p:nvGrpSpPr>
+      <p:grpSpPr/>
+      <p:sp>
+        <p:nvSpPr>
+          <p:cNvPr id="2" name="Text Placeholder 1"/>
+          <p:cNvSpPr>
+            <a:spLocks noGrp="1"/>
+          </p:cNvSpPr>
+          <p:nvPr>
+            <p:ph type="body" idx="10" sz="quarter"/>
+          </p:nvPr>
+        </p:nvSpPr>
+        <p:spPr/>
+        <p:txBody>
+          <a:bodyPr/>
+          <a:lstStyle/>
+          <a:p>
+            <a:r>
+              <a:t>Next Steps</a:t>
+            </a:r>
+          </a:p>
+        </p:txBody>
+      </p:sp>
+      <p:pic>
+        <p:nvPicPr>
+          <p:cNvPr id="3" name="Picture Placeholder 2" descr="consulting_company_logo.png"/>
+          <p:cNvPicPr>
+            <a:picLocks noGrp="1" noChangeAspect="1"/>
+          </p:cNvPicPr>
+          <p:nvPr>
+            <p:ph type="pic" idx="13" sz="quarter"/>
+          </p:nvPr>
+        </p:nvPicPr>
+        <p:blipFill>
+          <a:blip r:embed="rId2"/>
+          <a:srcRect t="6762" b="6762"/>
+          <a:stretch>
+            <a:fillRect/>
+          </a:stretch>
+        </p:blipFill>
+        <p:spPr/>
+      </p:pic>
+      <p:sp>
+        <p:nvSpPr>
+          <p:cNvPr id="4" name="Text Placeholder 3"/>
+          <p:cNvSpPr>
+            <a:spLocks noGrp="1"/>
+          </p:cNvSpPr>
+          <p:nvPr>
+            <p:ph type="body" idx="14" sz="quarter"/>
+          </p:nvPr>
+        </p:nvSpPr>
+        <p:spPr/>
+        <p:txBody>
+          <a:bodyPr/>
+          <a:lstStyle/>
+          <a:p>
+            <a:pPr/>
+            <a:r>
+              <a:rPr b="1"/>
+              <a:t>Decision:</a:t>
+            </a:r>
+            <a:r>
+              <a:t> Executive approval for pilot phase by [specific date]</a:t>
+            </a:r>
+          </a:p>
+          <a:p>
+            <a:pPr/>
+            <a:r>
+              <a:rPr b="1"/>
+              <a:t>Kickoff:</a:t>
+            </a:r>
+            <a:r>
+              <a:t> Target pilot start date [30 days from approval]</a:t>
+            </a:r>
+          </a:p>
+          <a:p>
+            <a:pPr/>
+            <a:r>
+              <a:rPr b="1"/>
+              <a:t>Team Formation:</a:t>
+            </a:r>
+            <a:r>
+              <a:t> Identify business SME, IT contact, document samples</a:t>
+            </a:r>
+          </a:p>
+          <a:p>
+            <a:pPr/>
+            <a:r>
+              <a:rPr b="1"/>
+              <a:t>Week 1:</a:t>
+            </a:r>
+            <a:r>
+              <a:t> Contract finalization and AWS account setup</a:t>
+            </a:r>
+          </a:p>
+          <a:p>
+            <a:pPr/>
+            <a:r>
+              <a:rPr b="1"/>
+              <a:t>Week 2:</a:t>
+            </a:r>
+            <a:r>
+              <a:t> Document sample collection and AI model configuration</a:t>
+            </a:r>
+          </a:p>
+          <a:p>
+            <a:pPr/>
+            <a:r>
+              <a:rPr b="1"/>
+              <a:t>Week 3:</a:t>
+            </a:r>
+            <a:r>
+              <a:t> Textract/Comprehend training and initial testing</a:t>
+            </a:r>
+          </a:p>
+          <a:p>
+            <a:pPr/>
+            <a:r>
+              <a:rPr b="1"/>
+              <a:t>Week 4:</a:t>
+            </a:r>
+            <a:r>
+              <a:t> First production documents processed with validation</a:t>
+            </a:r>
+          </a:p>
+        </p:txBody>
+      </p:sp>
+      <p:pic>
+        <p:nvPicPr>
+          <p:cNvPr id="5" name="Picture 4" descr="eo-framework-logo-real.png"/>
+          <p:cNvPicPr>
+            <a:picLocks noChangeAspect="1"/>
+          </p:cNvPicPr>
+          <p:nvPr/>
+        </p:nvPicPr>
+        <p:blipFill>
+          <a:blip r:embed="rId3"/>
+          <a:stretch>
+            <a:fillRect/>
+          </a:stretch>
+        </p:blipFill>
+        <p:spPr>
+          <a:xfrm>
+            <a:off x="6684264" y="4535424"/>
+            <a:ext cx="2139696" cy="530352"/>
+          </a:xfrm>
+          <a:prstGeom prst="rect">
+            <a:avLst/>
+          </a:prstGeom>
+        </p:spPr>
+      </p:pic>
+    </p:spTree>
+  </p:cSld>
+  <p:clrMapOvr>
+    <a:masterClrMapping/>
+  </p:clrMapOvr>
+</p:sld>
+</file>
+
+<file path=ppt/slides/slide11.xml><?xml version="1.0" encoding="utf-8"?>
 <p:sld xmlns:a="http://schemas.openxmlformats.org/drawingml/2006/main" xmlns:p="http://schemas.openxmlformats.org/presentationml/2006/main" xmlns:r="http://schemas.openxmlformats.org/officeDocument/2006/relationships">
   <p:cSld>
     <p:spTree>
@@ -3730,6 +3899,1032 @@
           <a:bodyPr/>
           <a:lstStyle/>
           <a:p>
+            <a:pPr algn="l"/>
+            <a:r>
+              <a:rPr b="1"/>
+              <a:t>Engagement Scope</a:t>
+            </a:r>
+          </a:p>
+        </p:txBody>
+      </p:sp>
+      <p:pic>
+        <p:nvPicPr>
+          <p:cNvPr id="3" name="Picture Placeholder 2" descr="consulting_company_logo.png"/>
+          <p:cNvPicPr>
+            <a:picLocks noGrp="1" noChangeAspect="1"/>
+          </p:cNvPicPr>
+          <p:nvPr>
+            <p:ph type="pic" idx="13" sz="quarter"/>
+          </p:nvPr>
+        </p:nvPicPr>
+        <p:blipFill>
+          <a:blip r:embed="rId2"/>
+          <a:srcRect t="6404" b="6404"/>
+          <a:stretch>
+            <a:fillRect/>
+          </a:stretch>
+        </p:blipFill>
+        <p:spPr/>
+      </p:pic>
+      <p:graphicFrame>
+        <p:nvGraphicFramePr>
+          <p:cNvPr id="4" name="Table Placeholder 3"/>
+          <p:cNvGraphicFramePr>
+            <a:graphicFrameLocks noGrp="1"/>
+          </p:cNvGraphicFramePr>
+          <p:nvPr>
+            <p:ph type="tbl" idx="14" sz="quarter"/>
+          </p:nvPr>
+        </p:nvGraphicFramePr>
+        <p:xfrm>
+          <a:off x="256855" y="677011"/>
+          <a:ext cx="8710931" cy="6304280"/>
+        </p:xfrm>
+        <a:graphic>
+          <a:graphicData uri="http://schemas.openxmlformats.org/drawingml/2006/table">
+            <a:tbl>
+              <a:tblPr firstRow="1" bandRow="1">
+                <a:tableStyleId>{5C22544A-7EE6-4342-B048-85BDC9FD1C3A}</a:tableStyleId>
+              </a:tblPr>
+              <a:tblGrid>
+                <a:gridCol w="2613279"/>
+                <a:gridCol w="3048826"/>
+                <a:gridCol w="3048826"/>
+              </a:tblGrid>
+              <a:tr h="370840">
+                <a:tc>
+                  <a:txBody>
+                    <a:bodyPr/>
+                    <a:lstStyle/>
+                    <a:p>
+                      <a:r>
+                        <a:rPr sz="1400">
+                          <a:solidFill>
+                            <a:srgbClr val="FFFFFF"/>
+                          </a:solidFill>
+                        </a:rPr>
+                        <a:t>Category</a:t>
+                      </a:r>
+                    </a:p>
+                  </a:txBody>
+                  <a:tcPr>
+                    <a:solidFill>
+                      <a:srgbClr val="A01C02"/>
+                    </a:solidFill>
+                  </a:tcPr>
+                </a:tc>
+                <a:tc>
+                  <a:txBody>
+                    <a:bodyPr/>
+                    <a:lstStyle/>
+                    <a:p>
+                      <a:r>
+                        <a:rPr sz="1400">
+                          <a:solidFill>
+                            <a:srgbClr val="FFFFFF"/>
+                          </a:solidFill>
+                        </a:rPr>
+                        <a:t>Parameter</a:t>
+                      </a:r>
+                    </a:p>
+                  </a:txBody>
+                  <a:tcPr>
+                    <a:solidFill>
+                      <a:srgbClr val="A01C02"/>
+                    </a:solidFill>
+                  </a:tcPr>
+                </a:tc>
+                <a:tc>
+                  <a:txBody>
+                    <a:bodyPr/>
+                    <a:lstStyle/>
+                    <a:p>
+                      <a:r>
+                        <a:rPr sz="1400">
+                          <a:solidFill>
+                            <a:srgbClr val="FFFFFF"/>
+                          </a:solidFill>
+                        </a:rPr>
+                        <a:t>Scope</a:t>
+                      </a:r>
+                    </a:p>
+                  </a:txBody>
+                  <a:tcPr>
+                    <a:solidFill>
+                      <a:srgbClr val="A01C02"/>
+                    </a:solidFill>
+                  </a:tcPr>
+                </a:tc>
+              </a:tr>
+              <a:tr h="370840">
+                <a:tc>
+                  <a:txBody>
+                    <a:bodyPr/>
+                    <a:lstStyle/>
+                    <a:p>
+                      <a:r>
+                        <a:rPr sz="1100"/>
+                        <a:t>Solution Scope</a:t>
+                      </a:r>
+                    </a:p>
+                  </a:txBody>
+                  <a:tcPr>
+                    <a:solidFill>
+                      <a:srgbClr val="E7E6E6"/>
+                    </a:solidFill>
+                  </a:tcPr>
+                </a:tc>
+                <a:tc>
+                  <a:txBody>
+                    <a:bodyPr/>
+                    <a:lstStyle/>
+                    <a:p>
+                      <a:r>
+                        <a:rPr sz="1100"/>
+                        <a:t>Document Types</a:t>
+                      </a:r>
+                    </a:p>
+                  </a:txBody>
+                  <a:tcPr>
+                    <a:solidFill>
+                      <a:srgbClr val="E7E6E6"/>
+                    </a:solidFill>
+                  </a:tcPr>
+                </a:tc>
+                <a:tc>
+                  <a:txBody>
+                    <a:bodyPr/>
+                    <a:lstStyle/>
+                    <a:p>
+                      <a:r>
+                        <a:rPr sz="1100"/>
+                        <a:t>2-3 document types</a:t>
+                      </a:r>
+                    </a:p>
+                  </a:txBody>
+                  <a:tcPr>
+                    <a:solidFill>
+                      <a:srgbClr val="E7E6E6"/>
+                    </a:solidFill>
+                  </a:tcPr>
+                </a:tc>
+              </a:tr>
+              <a:tr h="370840">
+                <a:tc>
+                  <a:txBody>
+                    <a:bodyPr/>
+                    <a:lstStyle/>
+                    <a:p>
+                      <a:r>
+                        <a:rPr sz="1100"/>
+                        <a:t>Solution Scope</a:t>
+                      </a:r>
+                    </a:p>
+                  </a:txBody>
+                  <a:tcPr>
+                    <a:solidFill>
+                      <a:srgbClr val="E7E6E6"/>
+                    </a:solidFill>
+                  </a:tcPr>
+                </a:tc>
+                <a:tc>
+                  <a:txBody>
+                    <a:bodyPr/>
+                    <a:lstStyle/>
+                    <a:p>
+                      <a:r>
+                        <a:rPr sz="1100"/>
+                        <a:t>AI/ML Complexity</a:t>
+                      </a:r>
+                    </a:p>
+                  </a:txBody>
+                  <a:tcPr>
+                    <a:solidFill>
+                      <a:srgbClr val="E7E6E6"/>
+                    </a:solidFill>
+                  </a:tcPr>
+                </a:tc>
+                <a:tc>
+                  <a:txBody>
+                    <a:bodyPr/>
+                    <a:lstStyle/>
+                    <a:p>
+                      <a:r>
+                        <a:rPr sz="1100"/>
+                        <a:t>AWS Textract/Comprehend only</a:t>
+                      </a:r>
+                    </a:p>
+                  </a:txBody>
+                  <a:tcPr>
+                    <a:solidFill>
+                      <a:srgbClr val="E7E6E6"/>
+                    </a:solidFill>
+                  </a:tcPr>
+                </a:tc>
+              </a:tr>
+              <a:tr h="370840">
+                <a:tc>
+                  <a:txBody>
+                    <a:bodyPr/>
+                    <a:lstStyle/>
+                    <a:p>
+                      <a:r>
+                        <a:rPr sz="1100"/>
+                        <a:t>Integration</a:t>
+                      </a:r>
+                    </a:p>
+                  </a:txBody>
+                  <a:tcPr>
+                    <a:solidFill>
+                      <a:srgbClr val="E7E6E6"/>
+                    </a:solidFill>
+                  </a:tcPr>
+                </a:tc>
+                <a:tc>
+                  <a:txBody>
+                    <a:bodyPr/>
+                    <a:lstStyle/>
+                    <a:p>
+                      <a:r>
+                        <a:rPr sz="1100"/>
+                        <a:t>External System Integrations</a:t>
+                      </a:r>
+                    </a:p>
+                  </a:txBody>
+                  <a:tcPr>
+                    <a:solidFill>
+                      <a:srgbClr val="E7E6E6"/>
+                    </a:solidFill>
+                  </a:tcPr>
+                </a:tc>
+                <a:tc>
+                  <a:txBody>
+                    <a:bodyPr/>
+                    <a:lstStyle/>
+                    <a:p>
+                      <a:r>
+                        <a:rPr sz="1100"/>
+                        <a:t>2 REST APIs</a:t>
+                      </a:r>
+                    </a:p>
+                  </a:txBody>
+                  <a:tcPr>
+                    <a:solidFill>
+                      <a:srgbClr val="E7E6E6"/>
+                    </a:solidFill>
+                  </a:tcPr>
+                </a:tc>
+              </a:tr>
+              <a:tr h="370840">
+                <a:tc>
+                  <a:txBody>
+                    <a:bodyPr/>
+                    <a:lstStyle/>
+                    <a:p>
+                      <a:r>
+                        <a:rPr sz="1100"/>
+                        <a:t>Integration</a:t>
+                      </a:r>
+                    </a:p>
+                  </a:txBody>
+                  <a:tcPr>
+                    <a:solidFill>
+                      <a:srgbClr val="E7E6E6"/>
+                    </a:solidFill>
+                  </a:tcPr>
+                </a:tc>
+                <a:tc>
+                  <a:txBody>
+                    <a:bodyPr/>
+                    <a:lstStyle/>
+                    <a:p>
+                      <a:r>
+                        <a:rPr sz="1100"/>
+                        <a:t>Data Sources</a:t>
+                      </a:r>
+                    </a:p>
+                  </a:txBody>
+                  <a:tcPr>
+                    <a:solidFill>
+                      <a:srgbClr val="E7E6E6"/>
+                    </a:solidFill>
+                  </a:tcPr>
+                </a:tc>
+                <a:tc>
+                  <a:txBody>
+                    <a:bodyPr/>
+                    <a:lstStyle/>
+                    <a:p>
+                      <a:r>
+                        <a:rPr sz="1100"/>
+                        <a:t>S3 and email ingestion</a:t>
+                      </a:r>
+                    </a:p>
+                  </a:txBody>
+                  <a:tcPr>
+                    <a:solidFill>
+                      <a:srgbClr val="E7E6E6"/>
+                    </a:solidFill>
+                  </a:tcPr>
+                </a:tc>
+              </a:tr>
+              <a:tr h="370840">
+                <a:tc>
+                  <a:txBody>
+                    <a:bodyPr/>
+                    <a:lstStyle/>
+                    <a:p>
+                      <a:r>
+                        <a:rPr sz="1100"/>
+                        <a:t>User Base</a:t>
+                      </a:r>
+                    </a:p>
+                  </a:txBody>
+                  <a:tcPr>
+                    <a:solidFill>
+                      <a:srgbClr val="E7E6E6"/>
+                    </a:solidFill>
+                  </a:tcPr>
+                </a:tc>
+                <a:tc>
+                  <a:txBody>
+                    <a:bodyPr/>
+                    <a:lstStyle/>
+                    <a:p>
+                      <a:r>
+                        <a:rPr sz="1100"/>
+                        <a:t>Total Users</a:t>
+                      </a:r>
+                    </a:p>
+                  </a:txBody>
+                  <a:tcPr>
+                    <a:solidFill>
+                      <a:srgbClr val="E7E6E6"/>
+                    </a:solidFill>
+                  </a:tcPr>
+                </a:tc>
+                <a:tc>
+                  <a:txBody>
+                    <a:bodyPr/>
+                    <a:lstStyle/>
+                    <a:p>
+                      <a:r>
+                        <a:rPr sz="1100"/>
+                        <a:t>50 users</a:t>
+                      </a:r>
+                    </a:p>
+                  </a:txBody>
+                  <a:tcPr>
+                    <a:solidFill>
+                      <a:srgbClr val="E7E6E6"/>
+                    </a:solidFill>
+                  </a:tcPr>
+                </a:tc>
+              </a:tr>
+              <a:tr h="370840">
+                <a:tc>
+                  <a:txBody>
+                    <a:bodyPr/>
+                    <a:lstStyle/>
+                    <a:p>
+                      <a:r>
+                        <a:rPr sz="1100"/>
+                        <a:t>User Base</a:t>
+                      </a:r>
+                    </a:p>
+                  </a:txBody>
+                  <a:tcPr>
+                    <a:solidFill>
+                      <a:srgbClr val="E7E6E6"/>
+                    </a:solidFill>
+                  </a:tcPr>
+                </a:tc>
+                <a:tc>
+                  <a:txBody>
+                    <a:bodyPr/>
+                    <a:lstStyle/>
+                    <a:p>
+                      <a:r>
+                        <a:rPr sz="1100"/>
+                        <a:t>User Roles</a:t>
+                      </a:r>
+                    </a:p>
+                  </a:txBody>
+                  <a:tcPr>
+                    <a:solidFill>
+                      <a:srgbClr val="E7E6E6"/>
+                    </a:solidFill>
+                  </a:tcPr>
+                </a:tc>
+                <a:tc>
+                  <a:txBody>
+                    <a:bodyPr/>
+                    <a:lstStyle/>
+                    <a:p>
+                      <a:r>
+                        <a:rPr sz="1100"/>
+                        <a:t>3 roles (submitter reviewer admin)</a:t>
+                      </a:r>
+                    </a:p>
+                  </a:txBody>
+                  <a:tcPr>
+                    <a:solidFill>
+                      <a:srgbClr val="E7E6E6"/>
+                    </a:solidFill>
+                  </a:tcPr>
+                </a:tc>
+              </a:tr>
+              <a:tr h="370840">
+                <a:tc>
+                  <a:txBody>
+                    <a:bodyPr/>
+                    <a:lstStyle/>
+                    <a:p>
+                      <a:r>
+                        <a:rPr sz="1100"/>
+                        <a:t>Data Volume</a:t>
+                      </a:r>
+                    </a:p>
+                  </a:txBody>
+                  <a:tcPr>
+                    <a:solidFill>
+                      <a:srgbClr val="E7E6E6"/>
+                    </a:solidFill>
+                  </a:tcPr>
+                </a:tc>
+                <a:tc>
+                  <a:txBody>
+                    <a:bodyPr/>
+                    <a:lstStyle/>
+                    <a:p>
+                      <a:r>
+                        <a:rPr sz="1100"/>
+                        <a:t>Document Processing Volume</a:t>
+                      </a:r>
+                    </a:p>
+                  </a:txBody>
+                  <a:tcPr>
+                    <a:solidFill>
+                      <a:srgbClr val="E7E6E6"/>
+                    </a:solidFill>
+                  </a:tcPr>
+                </a:tc>
+                <a:tc>
+                  <a:txBody>
+                    <a:bodyPr/>
+                    <a:lstStyle/>
+                    <a:p>
+                      <a:r>
+                        <a:rPr sz="1100"/>
+                        <a:t>1000-5000 docs/month</a:t>
+                      </a:r>
+                    </a:p>
+                  </a:txBody>
+                  <a:tcPr>
+                    <a:solidFill>
+                      <a:srgbClr val="E7E6E6"/>
+                    </a:solidFill>
+                  </a:tcPr>
+                </a:tc>
+              </a:tr>
+              <a:tr h="370840">
+                <a:tc>
+                  <a:txBody>
+                    <a:bodyPr/>
+                    <a:lstStyle/>
+                    <a:p>
+                      <a:r>
+                        <a:rPr sz="1100"/>
+                        <a:t>Data Volume</a:t>
+                      </a:r>
+                    </a:p>
+                  </a:txBody>
+                  <a:tcPr>
+                    <a:solidFill>
+                      <a:srgbClr val="E7E6E6"/>
+                    </a:solidFill>
+                  </a:tcPr>
+                </a:tc>
+                <a:tc>
+                  <a:txBody>
+                    <a:bodyPr/>
+                    <a:lstStyle/>
+                    <a:p>
+                      <a:r>
+                        <a:rPr sz="1100"/>
+                        <a:t>Data Storage Requirements</a:t>
+                      </a:r>
+                    </a:p>
+                  </a:txBody>
+                  <a:tcPr>
+                    <a:solidFill>
+                      <a:srgbClr val="E7E6E6"/>
+                    </a:solidFill>
+                  </a:tcPr>
+                </a:tc>
+                <a:tc>
+                  <a:txBody>
+                    <a:bodyPr/>
+                    <a:lstStyle/>
+                    <a:p>
+                      <a:r>
+                        <a:rPr sz="1100"/>
+                        <a:t>500 GB</a:t>
+                      </a:r>
+                    </a:p>
+                  </a:txBody>
+                  <a:tcPr>
+                    <a:solidFill>
+                      <a:srgbClr val="E7E6E6"/>
+                    </a:solidFill>
+                  </a:tcPr>
+                </a:tc>
+              </a:tr>
+              <a:tr h="370840">
+                <a:tc>
+                  <a:txBody>
+                    <a:bodyPr/>
+                    <a:lstStyle/>
+                    <a:p>
+                      <a:r>
+                        <a:rPr sz="1100"/>
+                        <a:t>Technical Environment</a:t>
+                      </a:r>
+                    </a:p>
+                  </a:txBody>
+                  <a:tcPr>
+                    <a:solidFill>
+                      <a:srgbClr val="E7E6E6"/>
+                    </a:solidFill>
+                  </a:tcPr>
+                </a:tc>
+                <a:tc>
+                  <a:txBody>
+                    <a:bodyPr/>
+                    <a:lstStyle/>
+                    <a:p>
+                      <a:r>
+                        <a:rPr sz="1100"/>
+                        <a:t>Deployment Regions</a:t>
+                      </a:r>
+                    </a:p>
+                  </a:txBody>
+                  <a:tcPr>
+                    <a:solidFill>
+                      <a:srgbClr val="E7E6E6"/>
+                    </a:solidFill>
+                  </a:tcPr>
+                </a:tc>
+                <a:tc>
+                  <a:txBody>
+                    <a:bodyPr/>
+                    <a:lstStyle/>
+                    <a:p>
+                      <a:r>
+                        <a:rPr sz="1100"/>
+                        <a:t>Single AWS region (us-east-1)</a:t>
+                      </a:r>
+                    </a:p>
+                  </a:txBody>
+                  <a:tcPr>
+                    <a:solidFill>
+                      <a:srgbClr val="E7E6E6"/>
+                    </a:solidFill>
+                  </a:tcPr>
+                </a:tc>
+              </a:tr>
+              <a:tr h="370840">
+                <a:tc>
+                  <a:txBody>
+                    <a:bodyPr/>
+                    <a:lstStyle/>
+                    <a:p>
+                      <a:r>
+                        <a:rPr sz="1100"/>
+                        <a:t>Technical Environment</a:t>
+                      </a:r>
+                    </a:p>
+                  </a:txBody>
+                  <a:tcPr>
+                    <a:solidFill>
+                      <a:srgbClr val="E7E6E6"/>
+                    </a:solidFill>
+                  </a:tcPr>
+                </a:tc>
+                <a:tc>
+                  <a:txBody>
+                    <a:bodyPr/>
+                    <a:lstStyle/>
+                    <a:p>
+                      <a:r>
+                        <a:rPr sz="1100"/>
+                        <a:t>Availability Requirements</a:t>
+                      </a:r>
+                    </a:p>
+                  </a:txBody>
+                  <a:tcPr>
+                    <a:solidFill>
+                      <a:srgbClr val="E7E6E6"/>
+                    </a:solidFill>
+                  </a:tcPr>
+                </a:tc>
+                <a:tc>
+                  <a:txBody>
+                    <a:bodyPr/>
+                    <a:lstStyle/>
+                    <a:p>
+                      <a:r>
+                        <a:rPr sz="1100"/>
+                        <a:t>Standard (99.5%)</a:t>
+                      </a:r>
+                    </a:p>
+                  </a:txBody>
+                  <a:tcPr>
+                    <a:solidFill>
+                      <a:srgbClr val="E7E6E6"/>
+                    </a:solidFill>
+                  </a:tcPr>
+                </a:tc>
+              </a:tr>
+              <a:tr h="370840">
+                <a:tc>
+                  <a:txBody>
+                    <a:bodyPr/>
+                    <a:lstStyle/>
+                    <a:p>
+                      <a:r>
+                        <a:rPr sz="1100"/>
+                        <a:t>Technical Environment</a:t>
+                      </a:r>
+                    </a:p>
+                  </a:txBody>
+                  <a:tcPr>
+                    <a:solidFill>
+                      <a:srgbClr val="E7E6E6"/>
+                    </a:solidFill>
+                  </a:tcPr>
+                </a:tc>
+                <a:tc>
+                  <a:txBody>
+                    <a:bodyPr/>
+                    <a:lstStyle/>
+                    <a:p>
+                      <a:r>
+                        <a:rPr sz="1100"/>
+                        <a:t>Infrastructure Complexity</a:t>
+                      </a:r>
+                    </a:p>
+                  </a:txBody>
+                  <a:tcPr>
+                    <a:solidFill>
+                      <a:srgbClr val="E7E6E6"/>
+                    </a:solidFill>
+                  </a:tcPr>
+                </a:tc>
+                <a:tc>
+                  <a:txBody>
+                    <a:bodyPr/>
+                    <a:lstStyle/>
+                    <a:p>
+                      <a:r>
+                        <a:rPr sz="1100"/>
+                        <a:t>Serverless (Lambda S3 Textract)</a:t>
+                      </a:r>
+                    </a:p>
+                  </a:txBody>
+                  <a:tcPr>
+                    <a:solidFill>
+                      <a:srgbClr val="E7E6E6"/>
+                    </a:solidFill>
+                  </a:tcPr>
+                </a:tc>
+              </a:tr>
+              <a:tr h="370840">
+                <a:tc>
+                  <a:txBody>
+                    <a:bodyPr/>
+                    <a:lstStyle/>
+                    <a:p>
+                      <a:r>
+                        <a:rPr sz="1100"/>
+                        <a:t>Security &amp; Compliance</a:t>
+                      </a:r>
+                    </a:p>
+                  </a:txBody>
+                  <a:tcPr>
+                    <a:solidFill>
+                      <a:srgbClr val="E7E6E6"/>
+                    </a:solidFill>
+                  </a:tcPr>
+                </a:tc>
+                <a:tc>
+                  <a:txBody>
+                    <a:bodyPr/>
+                    <a:lstStyle/>
+                    <a:p>
+                      <a:r>
+                        <a:rPr sz="1100"/>
+                        <a:t>Security Requirements</a:t>
+                      </a:r>
+                    </a:p>
+                  </a:txBody>
+                  <a:tcPr>
+                    <a:solidFill>
+                      <a:srgbClr val="E7E6E6"/>
+                    </a:solidFill>
+                  </a:tcPr>
+                </a:tc>
+                <a:tc>
+                  <a:txBody>
+                    <a:bodyPr/>
+                    <a:lstStyle/>
+                    <a:p>
+                      <a:r>
+                        <a:rPr sz="1100"/>
+                        <a:t>Basic encryption IAM SSE-S3</a:t>
+                      </a:r>
+                    </a:p>
+                  </a:txBody>
+                  <a:tcPr>
+                    <a:solidFill>
+                      <a:srgbClr val="E7E6E6"/>
+                    </a:solidFill>
+                  </a:tcPr>
+                </a:tc>
+              </a:tr>
+              <a:tr h="370840">
+                <a:tc>
+                  <a:txBody>
+                    <a:bodyPr/>
+                    <a:lstStyle/>
+                    <a:p>
+                      <a:r>
+                        <a:rPr sz="1100"/>
+                        <a:t>Security &amp; Compliance</a:t>
+                      </a:r>
+                    </a:p>
+                  </a:txBody>
+                  <a:tcPr>
+                    <a:solidFill>
+                      <a:srgbClr val="E7E6E6"/>
+                    </a:solidFill>
+                  </a:tcPr>
+                </a:tc>
+                <a:tc>
+                  <a:txBody>
+                    <a:bodyPr/>
+                    <a:lstStyle/>
+                    <a:p>
+                      <a:r>
+                        <a:rPr sz="1100"/>
+                        <a:t>Compliance Frameworks</a:t>
+                      </a:r>
+                    </a:p>
+                  </a:txBody>
+                  <a:tcPr>
+                    <a:solidFill>
+                      <a:srgbClr val="E7E6E6"/>
+                    </a:solidFill>
+                  </a:tcPr>
+                </a:tc>
+                <a:tc>
+                  <a:txBody>
+                    <a:bodyPr/>
+                    <a:lstStyle/>
+                    <a:p>
+                      <a:r>
+                        <a:rPr sz="1100"/>
+                        <a:t>SOC2</a:t>
+                      </a:r>
+                    </a:p>
+                  </a:txBody>
+                  <a:tcPr>
+                    <a:solidFill>
+                      <a:srgbClr val="E7E6E6"/>
+                    </a:solidFill>
+                  </a:tcPr>
+                </a:tc>
+              </a:tr>
+              <a:tr h="370840">
+                <a:tc>
+                  <a:txBody>
+                    <a:bodyPr/>
+                    <a:lstStyle/>
+                    <a:p>
+                      <a:r>
+                        <a:rPr sz="1100"/>
+                        <a:t>Performance</a:t>
+                      </a:r>
+                    </a:p>
+                  </a:txBody>
+                  <a:tcPr>
+                    <a:solidFill>
+                      <a:srgbClr val="E7E6E6"/>
+                    </a:solidFill>
+                  </a:tcPr>
+                </a:tc>
+                <a:tc>
+                  <a:txBody>
+                    <a:bodyPr/>
+                    <a:lstStyle/>
+                    <a:p>
+                      <a:r>
+                        <a:rPr sz="1100"/>
+                        <a:t>Accuracy Requirements</a:t>
+                      </a:r>
+                    </a:p>
+                  </a:txBody>
+                  <a:tcPr>
+                    <a:solidFill>
+                      <a:srgbClr val="E7E6E6"/>
+                    </a:solidFill>
+                  </a:tcPr>
+                </a:tc>
+                <a:tc>
+                  <a:txBody>
+                    <a:bodyPr/>
+                    <a:lstStyle/>
+                    <a:p>
+                      <a:r>
+                        <a:rPr sz="1100"/>
+                        <a:t>95%+ extraction accuracy</a:t>
+                      </a:r>
+                    </a:p>
+                  </a:txBody>
+                  <a:tcPr>
+                    <a:solidFill>
+                      <a:srgbClr val="E7E6E6"/>
+                    </a:solidFill>
+                  </a:tcPr>
+                </a:tc>
+              </a:tr>
+              <a:tr h="370840">
+                <a:tc>
+                  <a:txBody>
+                    <a:bodyPr/>
+                    <a:lstStyle/>
+                    <a:p>
+                      <a:r>
+                        <a:rPr sz="1100"/>
+                        <a:t>Performance</a:t>
+                      </a:r>
+                    </a:p>
+                  </a:txBody>
+                  <a:tcPr>
+                    <a:solidFill>
+                      <a:srgbClr val="E7E6E6"/>
+                    </a:solidFill>
+                  </a:tcPr>
+                </a:tc>
+                <a:tc>
+                  <a:txBody>
+                    <a:bodyPr/>
+                    <a:lstStyle/>
+                    <a:p>
+                      <a:r>
+                        <a:rPr sz="1100"/>
+                        <a:t>Processing Speed</a:t>
+                      </a:r>
+                    </a:p>
+                  </a:txBody>
+                  <a:tcPr>
+                    <a:solidFill>
+                      <a:srgbClr val="E7E6E6"/>
+                    </a:solidFill>
+                  </a:tcPr>
+                </a:tc>
+                <a:tc>
+                  <a:txBody>
+                    <a:bodyPr/>
+                    <a:lstStyle/>
+                    <a:p>
+                      <a:r>
+                        <a:rPr sz="1100"/>
+                        <a:t>Standard batch processing</a:t>
+                      </a:r>
+                    </a:p>
+                  </a:txBody>
+                  <a:tcPr>
+                    <a:solidFill>
+                      <a:srgbClr val="E7E6E6"/>
+                    </a:solidFill>
+                  </a:tcPr>
+                </a:tc>
+              </a:tr>
+              <a:tr h="370840">
+                <a:tc>
+                  <a:txBody>
+                    <a:bodyPr/>
+                    <a:lstStyle/>
+                    <a:p>
+                      <a:r>
+                        <a:rPr sz="1100"/>
+                        <a:t>Environment</a:t>
+                      </a:r>
+                    </a:p>
+                  </a:txBody>
+                  <a:tcPr>
+                    <a:solidFill>
+                      <a:srgbClr val="E7E6E6"/>
+                    </a:solidFill>
+                  </a:tcPr>
+                </a:tc>
+                <a:tc>
+                  <a:txBody>
+                    <a:bodyPr/>
+                    <a:lstStyle/>
+                    <a:p>
+                      <a:r>
+                        <a:rPr sz="1100"/>
+                        <a:t>Deployment Environments</a:t>
+                      </a:r>
+                    </a:p>
+                  </a:txBody>
+                  <a:tcPr>
+                    <a:solidFill>
+                      <a:srgbClr val="E7E6E6"/>
+                    </a:solidFill>
+                  </a:tcPr>
+                </a:tc>
+                <a:tc>
+                  <a:txBody>
+                    <a:bodyPr/>
+                    <a:lstStyle/>
+                    <a:p>
+                      <a:r>
+                        <a:rPr sz="1100"/>
+                        <a:t>2 environments (dev prod)</a:t>
+                      </a:r>
+                    </a:p>
+                  </a:txBody>
+                  <a:tcPr>
+                    <a:solidFill>
+                      <a:srgbClr val="E7E6E6"/>
+                    </a:solidFill>
+                  </a:tcPr>
+                </a:tc>
+              </a:tr>
+            </a:tbl>
+          </a:graphicData>
+        </a:graphic>
+      </p:graphicFrame>
+      <p:pic>
+        <p:nvPicPr>
+          <p:cNvPr id="5" name="Picture 4" descr="eo-framework-logo-real.png"/>
+          <p:cNvPicPr>
+            <a:picLocks noChangeAspect="1"/>
+          </p:cNvPicPr>
+          <p:nvPr/>
+        </p:nvPicPr>
+        <p:blipFill>
+          <a:blip r:embed="rId3"/>
+          <a:stretch>
+            <a:fillRect/>
+          </a:stretch>
+        </p:blipFill>
+        <p:spPr>
+          <a:xfrm>
+            <a:off x="6684264" y="4535424"/>
+            <a:ext cx="2139696" cy="530352"/>
+          </a:xfrm>
+          <a:prstGeom prst="rect">
+            <a:avLst/>
+          </a:prstGeom>
+        </p:spPr>
+      </p:pic>
+    </p:spTree>
+  </p:cSld>
+  <p:clrMapOvr>
+    <a:masterClrMapping/>
+  </p:clrMapOvr>
+</p:sld>
+</file>
+
+<file path=ppt/slides/slide4.xml><?xml version="1.0" encoding="utf-8"?>
+<p:sld xmlns:a="http://schemas.openxmlformats.org/drawingml/2006/main" xmlns:p="http://schemas.openxmlformats.org/presentationml/2006/main" xmlns:r="http://schemas.openxmlformats.org/officeDocument/2006/relationships">
+  <p:cSld>
+    <p:spTree>
+      <p:nvGrpSpPr>
+        <p:cNvPr id="1" name=""/>
+        <p:cNvGrpSpPr/>
+        <p:nvPr/>
+      </p:nvGrpSpPr>
+      <p:grpSpPr/>
+      <p:sp>
+        <p:nvSpPr>
+          <p:cNvPr id="2" name="Text Placeholder 1"/>
+          <p:cNvSpPr>
+            <a:spLocks noGrp="1"/>
+          </p:cNvSpPr>
+          <p:nvPr>
+            <p:ph type="body" idx="10" sz="quarter"/>
+          </p:nvPr>
+        </p:nvSpPr>
+        <p:spPr/>
+        <p:txBody>
+          <a:bodyPr/>
+          <a:lstStyle/>
+          <a:p>
             <a:r>
               <a:t>Solution Overview</a:t>
             </a:r>
@@ -3865,7 +5060,7 @@
 </p:sld>
 </file>
 
-<file path=ppt/slides/slide4.xml><?xml version="1.0" encoding="utf-8"?>
+<file path=ppt/slides/slide5.xml><?xml version="1.0" encoding="utf-8"?>
 <p:sld xmlns:a="http://schemas.openxmlformats.org/drawingml/2006/main" xmlns:p="http://schemas.openxmlformats.org/presentationml/2006/main" xmlns:r="http://schemas.openxmlformats.org/officeDocument/2006/relationships">
   <p:cSld>
     <p:spTree>
@@ -4006,416 +5201,6 @@
           </a:p>
         </p:txBody>
       </p:sp>
-      <p:pic>
-        <p:nvPicPr>
-          <p:cNvPr id="5" name="Picture 4" descr="eo-framework-logo-real.png"/>
-          <p:cNvPicPr>
-            <a:picLocks noChangeAspect="1"/>
-          </p:cNvPicPr>
-          <p:nvPr/>
-        </p:nvPicPr>
-        <p:blipFill>
-          <a:blip r:embed="rId3"/>
-          <a:stretch>
-            <a:fillRect/>
-          </a:stretch>
-        </p:blipFill>
-        <p:spPr>
-          <a:xfrm>
-            <a:off x="6684264" y="4535424"/>
-            <a:ext cx="2139696" cy="530352"/>
-          </a:xfrm>
-          <a:prstGeom prst="rect">
-            <a:avLst/>
-          </a:prstGeom>
-        </p:spPr>
-      </p:pic>
-    </p:spTree>
-  </p:cSld>
-  <p:clrMapOvr>
-    <a:masterClrMapping/>
-  </p:clrMapOvr>
-</p:sld>
-</file>
-
-<file path=ppt/slides/slide5.xml><?xml version="1.0" encoding="utf-8"?>
-<p:sld xmlns:a="http://schemas.openxmlformats.org/drawingml/2006/main" xmlns:p="http://schemas.openxmlformats.org/presentationml/2006/main" xmlns:r="http://schemas.openxmlformats.org/officeDocument/2006/relationships">
-  <p:cSld>
-    <p:spTree>
-      <p:nvGrpSpPr>
-        <p:cNvPr id="1" name=""/>
-        <p:cNvGrpSpPr/>
-        <p:nvPr/>
-      </p:nvGrpSpPr>
-      <p:grpSpPr/>
-      <p:sp>
-        <p:nvSpPr>
-          <p:cNvPr id="2" name="Text Placeholder 1"/>
-          <p:cNvSpPr>
-            <a:spLocks noGrp="1"/>
-          </p:cNvSpPr>
-          <p:nvPr>
-            <p:ph type="body" idx="10" sz="quarter"/>
-          </p:nvPr>
-        </p:nvSpPr>
-        <p:spPr/>
-        <p:txBody>
-          <a:bodyPr/>
-          <a:lstStyle/>
-          <a:p>
-            <a:pPr algn="l"/>
-            <a:r>
-              <a:rPr b="1"/>
-              <a:t>Timeline &amp; Milestones</a:t>
-            </a:r>
-          </a:p>
-        </p:txBody>
-      </p:sp>
-      <p:pic>
-        <p:nvPicPr>
-          <p:cNvPr id="3" name="Picture Placeholder 2" descr="consulting_company_logo.png"/>
-          <p:cNvPicPr>
-            <a:picLocks noGrp="1" noChangeAspect="1"/>
-          </p:cNvPicPr>
-          <p:nvPr>
-            <p:ph type="pic" idx="13" sz="quarter"/>
-          </p:nvPr>
-        </p:nvPicPr>
-        <p:blipFill>
-          <a:blip r:embed="rId2"/>
-          <a:srcRect t="6404" b="6404"/>
-          <a:stretch>
-            <a:fillRect/>
-          </a:stretch>
-        </p:blipFill>
-        <p:spPr/>
-      </p:pic>
-      <p:graphicFrame>
-        <p:nvGraphicFramePr>
-          <p:cNvPr id="4" name="Table Placeholder 3"/>
-          <p:cNvGraphicFramePr>
-            <a:graphicFrameLocks noGrp="1"/>
-          </p:cNvGraphicFramePr>
-          <p:nvPr>
-            <p:ph type="tbl" idx="14" sz="quarter"/>
-          </p:nvPr>
-        </p:nvGraphicFramePr>
-        <p:xfrm>
-          <a:off x="256855" y="677011"/>
-          <a:ext cx="8710931" cy="1483360"/>
-        </p:xfrm>
-        <a:graphic>
-          <a:graphicData uri="http://schemas.openxmlformats.org/drawingml/2006/table">
-            <a:tbl>
-              <a:tblPr firstRow="1" bandRow="1">
-                <a:tableStyleId>{5C22544A-7EE6-4342-B048-85BDC9FD1C3A}</a:tableStyleId>
-              </a:tblPr>
-              <a:tblGrid>
-                <a:gridCol w="871093"/>
-                <a:gridCol w="2177733"/>
-                <a:gridCol w="1306639"/>
-                <a:gridCol w="4355466"/>
-              </a:tblGrid>
-              <a:tr h="370840">
-                <a:tc>
-                  <a:txBody>
-                    <a:bodyPr/>
-                    <a:lstStyle/>
-                    <a:p>
-                      <a:r>
-                        <a:rPr sz="1400">
-                          <a:solidFill>
-                            <a:srgbClr val="FFFFFF"/>
-                          </a:solidFill>
-                        </a:rPr>
-                        <a:t>Phase No</a:t>
-                      </a:r>
-                    </a:p>
-                  </a:txBody>
-                  <a:tcPr>
-                    <a:solidFill>
-                      <a:srgbClr val="A01C02"/>
-                    </a:solidFill>
-                  </a:tcPr>
-                </a:tc>
-                <a:tc>
-                  <a:txBody>
-                    <a:bodyPr/>
-                    <a:lstStyle/>
-                    <a:p>
-                      <a:r>
-                        <a:rPr sz="1400">
-                          <a:solidFill>
-                            <a:srgbClr val="FFFFFF"/>
-                          </a:solidFill>
-                        </a:rPr>
-                        <a:t>Phase Description</a:t>
-                      </a:r>
-                    </a:p>
-                  </a:txBody>
-                  <a:tcPr>
-                    <a:solidFill>
-                      <a:srgbClr val="A01C02"/>
-                    </a:solidFill>
-                  </a:tcPr>
-                </a:tc>
-                <a:tc>
-                  <a:txBody>
-                    <a:bodyPr/>
-                    <a:lstStyle/>
-                    <a:p>
-                      <a:r>
-                        <a:rPr sz="1400">
-                          <a:solidFill>
-                            <a:srgbClr val="FFFFFF"/>
-                          </a:solidFill>
-                        </a:rPr>
-                        <a:t>Timeline</a:t>
-                      </a:r>
-                    </a:p>
-                  </a:txBody>
-                  <a:tcPr>
-                    <a:solidFill>
-                      <a:srgbClr val="A01C02"/>
-                    </a:solidFill>
-                  </a:tcPr>
-                </a:tc>
-                <a:tc>
-                  <a:txBody>
-                    <a:bodyPr/>
-                    <a:lstStyle/>
-                    <a:p>
-                      <a:r>
-                        <a:rPr sz="1400">
-                          <a:solidFill>
-                            <a:srgbClr val="FFFFFF"/>
-                          </a:solidFill>
-                        </a:rPr>
-                        <a:t>Key Deliverables</a:t>
-                      </a:r>
-                    </a:p>
-                  </a:txBody>
-                  <a:tcPr>
-                    <a:solidFill>
-                      <a:srgbClr val="A01C02"/>
-                    </a:solidFill>
-                  </a:tcPr>
-                </a:tc>
-              </a:tr>
-              <a:tr h="370840">
-                <a:tc>
-                  <a:txBody>
-                    <a:bodyPr/>
-                    <a:lstStyle/>
-                    <a:p>
-                      <a:r>
-                        <a:rPr sz="1100"/>
-                        <a:t>Phase 1</a:t>
-                      </a:r>
-                    </a:p>
-                  </a:txBody>
-                  <a:tcPr>
-                    <a:solidFill>
-                      <a:srgbClr val="E7E6E6"/>
-                    </a:solidFill>
-                  </a:tcPr>
-                </a:tc>
-                <a:tc>
-                  <a:txBody>
-                    <a:bodyPr/>
-                    <a:lstStyle/>
-                    <a:p>
-                      <a:r>
-                        <a:rPr sz="1100"/>
-                        <a:t>Pilot &amp; Validation</a:t>
-                      </a:r>
-                    </a:p>
-                  </a:txBody>
-                  <a:tcPr>
-                    <a:solidFill>
-                      <a:srgbClr val="E7E6E6"/>
-                    </a:solidFill>
-                  </a:tcPr>
-                </a:tc>
-                <a:tc>
-                  <a:txBody>
-                    <a:bodyPr/>
-                    <a:lstStyle/>
-                    <a:p>
-                      <a:r>
-                        <a:rPr sz="1100"/>
-                        <a:t>Months 1-2</a:t>
-                      </a:r>
-                    </a:p>
-                  </a:txBody>
-                  <a:tcPr>
-                    <a:solidFill>
-                      <a:srgbClr val="E7E6E6"/>
-                    </a:solidFill>
-                  </a:tcPr>
-                </a:tc>
-                <a:tc>
-                  <a:txBody>
-                    <a:bodyPr/>
-                    <a:lstStyle/>
-                    <a:p>
-                      <a:r>
-                        <a:rPr sz="1100"/>
-                        <a:t>Single document type automated, 95%+ accuracy validated, Human review workflow operational</a:t>
-                      </a:r>
-                    </a:p>
-                  </a:txBody>
-                  <a:tcPr>
-                    <a:solidFill>
-                      <a:srgbClr val="E7E6E6"/>
-                    </a:solidFill>
-                  </a:tcPr>
-                </a:tc>
-              </a:tr>
-              <a:tr h="370840">
-                <a:tc>
-                  <a:txBody>
-                    <a:bodyPr/>
-                    <a:lstStyle/>
-                    <a:p>
-                      <a:r>
-                        <a:rPr sz="1100"/>
-                        <a:t>Phase 2</a:t>
-                      </a:r>
-                    </a:p>
-                  </a:txBody>
-                  <a:tcPr>
-                    <a:solidFill>
-                      <a:srgbClr val="E7E6E6"/>
-                    </a:solidFill>
-                  </a:tcPr>
-                </a:tc>
-                <a:tc>
-                  <a:txBody>
-                    <a:bodyPr/>
-                    <a:lstStyle/>
-                    <a:p>
-                      <a:r>
-                        <a:rPr sz="1100"/>
-                        <a:t>Expansion &amp; Integration</a:t>
-                      </a:r>
-                    </a:p>
-                  </a:txBody>
-                  <a:tcPr>
-                    <a:solidFill>
-                      <a:srgbClr val="E7E6E6"/>
-                    </a:solidFill>
-                  </a:tcPr>
-                </a:tc>
-                <a:tc>
-                  <a:txBody>
-                    <a:bodyPr/>
-                    <a:lstStyle/>
-                    <a:p>
-                      <a:r>
-                        <a:rPr sz="1100"/>
-                        <a:t>Months 3-4</a:t>
-                      </a:r>
-                    </a:p>
-                  </a:txBody>
-                  <a:tcPr>
-                    <a:solidFill>
-                      <a:srgbClr val="E7E6E6"/>
-                    </a:solidFill>
-                  </a:tcPr>
-                </a:tc>
-                <a:tc>
-                  <a:txBody>
-                    <a:bodyPr/>
-                    <a:lstStyle/>
-                    <a:p>
-                      <a:r>
-                        <a:rPr sz="1100"/>
-                        <a:t>Multiple document types supported, API integrations live, Volume processing at scale</a:t>
-                      </a:r>
-                    </a:p>
-                  </a:txBody>
-                  <a:tcPr>
-                    <a:solidFill>
-                      <a:srgbClr val="E7E6E6"/>
-                    </a:solidFill>
-                  </a:tcPr>
-                </a:tc>
-              </a:tr>
-              <a:tr h="370840">
-                <a:tc>
-                  <a:txBody>
-                    <a:bodyPr/>
-                    <a:lstStyle/>
-                    <a:p>
-                      <a:r>
-                        <a:rPr sz="1100"/>
-                        <a:t>Phase 3</a:t>
-                      </a:r>
-                    </a:p>
-                  </a:txBody>
-                  <a:tcPr>
-                    <a:solidFill>
-                      <a:srgbClr val="E7E6E6"/>
-                    </a:solidFill>
-                  </a:tcPr>
-                </a:tc>
-                <a:tc>
-                  <a:txBody>
-                    <a:bodyPr/>
-                    <a:lstStyle/>
-                    <a:p>
-                      <a:r>
-                        <a:rPr sz="1100"/>
-                        <a:t>Optimization &amp; Handoff</a:t>
-                      </a:r>
-                    </a:p>
-                  </a:txBody>
-                  <a:tcPr>
-                    <a:solidFill>
-                      <a:srgbClr val="E7E6E6"/>
-                    </a:solidFill>
-                  </a:tcPr>
-                </a:tc>
-                <a:tc>
-                  <a:txBody>
-                    <a:bodyPr/>
-                    <a:lstStyle/>
-                    <a:p>
-                      <a:r>
-                        <a:rPr sz="1100"/>
-                        <a:t>Months 5-6</a:t>
-                      </a:r>
-                    </a:p>
-                  </a:txBody>
-                  <a:tcPr>
-                    <a:solidFill>
-                      <a:srgbClr val="E7E6E6"/>
-                    </a:solidFill>
-                  </a:tcPr>
-                </a:tc>
-                <a:tc>
-                  <a:txBody>
-                    <a:bodyPr/>
-                    <a:lstStyle/>
-                    <a:p>
-                      <a:r>
-                        <a:rPr sz="1100"/>
-                        <a:t>AI models fine-tuned, Advanced features deployed, Operations team trained</a:t>
-                      </a:r>
-                    </a:p>
-                  </a:txBody>
-                  <a:tcPr>
-                    <a:solidFill>
-                      <a:srgbClr val="E7E6E6"/>
-                    </a:solidFill>
-                  </a:tcPr>
-                </a:tc>
-              </a:tr>
-            </a:tbl>
-          </a:graphicData>
-        </a:graphic>
-      </p:graphicFrame>
       <p:pic>
         <p:nvPicPr>
           <p:cNvPr id="5" name="Picture 4" descr="eo-framework-logo-real.png"/>
@@ -4473,8 +5258,10 @@
           <a:bodyPr/>
           <a:lstStyle/>
           <a:p>
-            <a:r>
-              <a:t>Success Stories</a:t>
+            <a:pPr algn="l"/>
+            <a:r>
+              <a:rPr b="1"/>
+              <a:t>Timeline &amp; Milestones</a:t>
             </a:r>
           </a:p>
         </p:txBody>
@@ -4491,93 +5278,339 @@
         </p:nvPicPr>
         <p:blipFill>
           <a:blip r:embed="rId2"/>
-          <a:srcRect t="6762" b="6762"/>
+          <a:srcRect t="6404" b="6404"/>
           <a:stretch>
             <a:fillRect/>
           </a:stretch>
         </p:blipFill>
         <p:spPr/>
       </p:pic>
-      <p:sp>
-        <p:nvSpPr>
-          <p:cNvPr id="4" name="Text Placeholder 3"/>
-          <p:cNvSpPr>
-            <a:spLocks noGrp="1"/>
-          </p:cNvSpPr>
+      <p:graphicFrame>
+        <p:nvGraphicFramePr>
+          <p:cNvPr id="4" name="Table Placeholder 3"/>
+          <p:cNvGraphicFramePr>
+            <a:graphicFrameLocks noGrp="1"/>
+          </p:cNvGraphicFramePr>
           <p:nvPr>
-            <p:ph type="body" idx="14" sz="quarter"/>
+            <p:ph type="tbl" idx="14" sz="quarter"/>
           </p:nvPr>
-        </p:nvSpPr>
-        <p:spPr/>
-        <p:txBody>
-          <a:bodyPr/>
-          <a:lstStyle/>
-          <a:p>
-            <a:pPr/>
-            <a:r>
-              <a:rPr b="1"/>
-              <a:t>Client Success: Healthcare Insurance Provider</a:t>
-            </a:r>
-          </a:p>
-          <a:p>
-            <a:pPr lvl="1"/>
-            <a:r>
-              <a:rPr b="1"/>
-              <a:t>Client:</a:t>
-            </a:r>
-            <a:r>
-              <a:t> Regional health insurer processing 50,000+ claims monthly</a:t>
-            </a:r>
-          </a:p>
-          <a:p>
-            <a:pPr lvl="1"/>
-            <a:r>
-              <a:rPr b="1"/>
-              <a:t>Challenge:</a:t>
-            </a:r>
-            <a:r>
-              <a:t> Manual processing taking 24-48 hours, 8% error rate, high labor costs limiting scalability</a:t>
-            </a:r>
-          </a:p>
-          <a:p>
-            <a:pPr lvl="1"/>
-            <a:r>
-              <a:rPr b="1"/>
-              <a:t>Solution:</a:t>
-            </a:r>
-            <a:r>
-              <a:t> AWS IDP with Textract, Comprehend, and A2I for automated claims processing</a:t>
-            </a:r>
-          </a:p>
-          <a:p>
-            <a:pPr lvl="1"/>
-            <a:r>
-              <a:rPr b="1"/>
-              <a:t>Results:</a:t>
-            </a:r>
-            <a:r>
-              <a:t> 92% faster processing (24hrs → 2hrs), 99.2% accuracy, $2.1M annual savings, ROI in 11 months</a:t>
-            </a:r>
-          </a:p>
-          <a:p>
-            <a:pPr lvl="1"/>
-            <a:r>
-              <a:rPr b="1"/>
-              <a:t>Testimonial:</a:t>
-            </a:r>
-            <a:r>
-              <a:t> "The AI accuracy exceeded our expectations. We've redeployed staff to complex cases requiring human judgment, dramatically improving both efficiency and job satisfaction." — </a:t>
-            </a:r>
-            <a:r>
-              <a:rPr b="1"/>
-              <a:t>Sarah Martinez, VP Operations</a:t>
-            </a:r>
-            <a:r>
-              <a:t>, HealthFirst Insurance</a:t>
-            </a:r>
-          </a:p>
-        </p:txBody>
-      </p:sp>
+        </p:nvGraphicFramePr>
+        <p:xfrm>
+          <a:off x="256855" y="677011"/>
+          <a:ext cx="8710931" cy="1483360"/>
+        </p:xfrm>
+        <a:graphic>
+          <a:graphicData uri="http://schemas.openxmlformats.org/drawingml/2006/table">
+            <a:tbl>
+              <a:tblPr firstRow="1" bandRow="1">
+                <a:tableStyleId>{5C22544A-7EE6-4342-B048-85BDC9FD1C3A}</a:tableStyleId>
+              </a:tblPr>
+              <a:tblGrid>
+                <a:gridCol w="871093"/>
+                <a:gridCol w="2177733"/>
+                <a:gridCol w="1306639"/>
+                <a:gridCol w="4355466"/>
+              </a:tblGrid>
+              <a:tr h="370840">
+                <a:tc>
+                  <a:txBody>
+                    <a:bodyPr/>
+                    <a:lstStyle/>
+                    <a:p>
+                      <a:r>
+                        <a:rPr sz="1400">
+                          <a:solidFill>
+                            <a:srgbClr val="FFFFFF"/>
+                          </a:solidFill>
+                        </a:rPr>
+                        <a:t>Phase No</a:t>
+                      </a:r>
+                    </a:p>
+                  </a:txBody>
+                  <a:tcPr>
+                    <a:solidFill>
+                      <a:srgbClr val="A01C02"/>
+                    </a:solidFill>
+                  </a:tcPr>
+                </a:tc>
+                <a:tc>
+                  <a:txBody>
+                    <a:bodyPr/>
+                    <a:lstStyle/>
+                    <a:p>
+                      <a:r>
+                        <a:rPr sz="1400">
+                          <a:solidFill>
+                            <a:srgbClr val="FFFFFF"/>
+                          </a:solidFill>
+                        </a:rPr>
+                        <a:t>Phase Description</a:t>
+                      </a:r>
+                    </a:p>
+                  </a:txBody>
+                  <a:tcPr>
+                    <a:solidFill>
+                      <a:srgbClr val="A01C02"/>
+                    </a:solidFill>
+                  </a:tcPr>
+                </a:tc>
+                <a:tc>
+                  <a:txBody>
+                    <a:bodyPr/>
+                    <a:lstStyle/>
+                    <a:p>
+                      <a:r>
+                        <a:rPr sz="1400">
+                          <a:solidFill>
+                            <a:srgbClr val="FFFFFF"/>
+                          </a:solidFill>
+                        </a:rPr>
+                        <a:t>Timeline</a:t>
+                      </a:r>
+                    </a:p>
+                  </a:txBody>
+                  <a:tcPr>
+                    <a:solidFill>
+                      <a:srgbClr val="A01C02"/>
+                    </a:solidFill>
+                  </a:tcPr>
+                </a:tc>
+                <a:tc>
+                  <a:txBody>
+                    <a:bodyPr/>
+                    <a:lstStyle/>
+                    <a:p>
+                      <a:r>
+                        <a:rPr sz="1400">
+                          <a:solidFill>
+                            <a:srgbClr val="FFFFFF"/>
+                          </a:solidFill>
+                        </a:rPr>
+                        <a:t>Key Deliverables</a:t>
+                      </a:r>
+                    </a:p>
+                  </a:txBody>
+                  <a:tcPr>
+                    <a:solidFill>
+                      <a:srgbClr val="A01C02"/>
+                    </a:solidFill>
+                  </a:tcPr>
+                </a:tc>
+              </a:tr>
+              <a:tr h="370840">
+                <a:tc>
+                  <a:txBody>
+                    <a:bodyPr/>
+                    <a:lstStyle/>
+                    <a:p>
+                      <a:r>
+                        <a:rPr sz="1100"/>
+                        <a:t>Phase 1</a:t>
+                      </a:r>
+                    </a:p>
+                  </a:txBody>
+                  <a:tcPr>
+                    <a:solidFill>
+                      <a:srgbClr val="E7E6E6"/>
+                    </a:solidFill>
+                  </a:tcPr>
+                </a:tc>
+                <a:tc>
+                  <a:txBody>
+                    <a:bodyPr/>
+                    <a:lstStyle/>
+                    <a:p>
+                      <a:r>
+                        <a:rPr sz="1100"/>
+                        <a:t>Pilot &amp; Validation</a:t>
+                      </a:r>
+                    </a:p>
+                  </a:txBody>
+                  <a:tcPr>
+                    <a:solidFill>
+                      <a:srgbClr val="E7E6E6"/>
+                    </a:solidFill>
+                  </a:tcPr>
+                </a:tc>
+                <a:tc>
+                  <a:txBody>
+                    <a:bodyPr/>
+                    <a:lstStyle/>
+                    <a:p>
+                      <a:r>
+                        <a:rPr sz="1100"/>
+                        <a:t>Months 1-2</a:t>
+                      </a:r>
+                    </a:p>
+                  </a:txBody>
+                  <a:tcPr>
+                    <a:solidFill>
+                      <a:srgbClr val="E7E6E6"/>
+                    </a:solidFill>
+                  </a:tcPr>
+                </a:tc>
+                <a:tc>
+                  <a:txBody>
+                    <a:bodyPr/>
+                    <a:lstStyle/>
+                    <a:p>
+                      <a:r>
+                        <a:rPr sz="1100"/>
+                        <a:t>Single document type automated, 95%+ accuracy validated, Human review workflow operational</a:t>
+                      </a:r>
+                    </a:p>
+                  </a:txBody>
+                  <a:tcPr>
+                    <a:solidFill>
+                      <a:srgbClr val="E7E6E6"/>
+                    </a:solidFill>
+                  </a:tcPr>
+                </a:tc>
+              </a:tr>
+              <a:tr h="370840">
+                <a:tc>
+                  <a:txBody>
+                    <a:bodyPr/>
+                    <a:lstStyle/>
+                    <a:p>
+                      <a:r>
+                        <a:rPr sz="1100"/>
+                        <a:t>Phase 2</a:t>
+                      </a:r>
+                    </a:p>
+                  </a:txBody>
+                  <a:tcPr>
+                    <a:solidFill>
+                      <a:srgbClr val="E7E6E6"/>
+                    </a:solidFill>
+                  </a:tcPr>
+                </a:tc>
+                <a:tc>
+                  <a:txBody>
+                    <a:bodyPr/>
+                    <a:lstStyle/>
+                    <a:p>
+                      <a:r>
+                        <a:rPr sz="1100"/>
+                        <a:t>Expansion &amp; Integration</a:t>
+                      </a:r>
+                    </a:p>
+                  </a:txBody>
+                  <a:tcPr>
+                    <a:solidFill>
+                      <a:srgbClr val="E7E6E6"/>
+                    </a:solidFill>
+                  </a:tcPr>
+                </a:tc>
+                <a:tc>
+                  <a:txBody>
+                    <a:bodyPr/>
+                    <a:lstStyle/>
+                    <a:p>
+                      <a:r>
+                        <a:rPr sz="1100"/>
+                        <a:t>Months 3-4</a:t>
+                      </a:r>
+                    </a:p>
+                  </a:txBody>
+                  <a:tcPr>
+                    <a:solidFill>
+                      <a:srgbClr val="E7E6E6"/>
+                    </a:solidFill>
+                  </a:tcPr>
+                </a:tc>
+                <a:tc>
+                  <a:txBody>
+                    <a:bodyPr/>
+                    <a:lstStyle/>
+                    <a:p>
+                      <a:r>
+                        <a:rPr sz="1100"/>
+                        <a:t>Multiple document types supported, API integrations live, Volume processing at scale</a:t>
+                      </a:r>
+                    </a:p>
+                  </a:txBody>
+                  <a:tcPr>
+                    <a:solidFill>
+                      <a:srgbClr val="E7E6E6"/>
+                    </a:solidFill>
+                  </a:tcPr>
+                </a:tc>
+              </a:tr>
+              <a:tr h="370840">
+                <a:tc>
+                  <a:txBody>
+                    <a:bodyPr/>
+                    <a:lstStyle/>
+                    <a:p>
+                      <a:r>
+                        <a:rPr sz="1100"/>
+                        <a:t>Phase 3</a:t>
+                      </a:r>
+                    </a:p>
+                  </a:txBody>
+                  <a:tcPr>
+                    <a:solidFill>
+                      <a:srgbClr val="E7E6E6"/>
+                    </a:solidFill>
+                  </a:tcPr>
+                </a:tc>
+                <a:tc>
+                  <a:txBody>
+                    <a:bodyPr/>
+                    <a:lstStyle/>
+                    <a:p>
+                      <a:r>
+                        <a:rPr sz="1100"/>
+                        <a:t>Optimization &amp; Handoff</a:t>
+                      </a:r>
+                    </a:p>
+                  </a:txBody>
+                  <a:tcPr>
+                    <a:solidFill>
+                      <a:srgbClr val="E7E6E6"/>
+                    </a:solidFill>
+                  </a:tcPr>
+                </a:tc>
+                <a:tc>
+                  <a:txBody>
+                    <a:bodyPr/>
+                    <a:lstStyle/>
+                    <a:p>
+                      <a:r>
+                        <a:rPr sz="1100"/>
+                        <a:t>Months 5-6</a:t>
+                      </a:r>
+                    </a:p>
+                  </a:txBody>
+                  <a:tcPr>
+                    <a:solidFill>
+                      <a:srgbClr val="E7E6E6"/>
+                    </a:solidFill>
+                  </a:tcPr>
+                </a:tc>
+                <a:tc>
+                  <a:txBody>
+                    <a:bodyPr/>
+                    <a:lstStyle/>
+                    <a:p>
+                      <a:r>
+                        <a:rPr sz="1100"/>
+                        <a:t>AI models fine-tuned, Advanced features deployed, Operations team trained</a:t>
+                      </a:r>
+                    </a:p>
+                  </a:txBody>
+                  <a:tcPr>
+                    <a:solidFill>
+                      <a:srgbClr val="E7E6E6"/>
+                    </a:solidFill>
+                  </a:tcPr>
+                </a:tc>
+              </a:tr>
+            </a:tbl>
+          </a:graphicData>
+        </a:graphic>
+      </p:graphicFrame>
       <p:pic>
         <p:nvPicPr>
           <p:cNvPr id="5" name="Picture 4" descr="eo-framework-logo-real.png"/>
@@ -4636,7 +5669,7 @@
           <a:lstStyle/>
           <a:p>
             <a:r>
-              <a:t>Our Partnership Advantage</a:t>
+              <a:t>Success Stories</a:t>
             </a:r>
           </a:p>
         </p:txBody>
@@ -4648,12 +5681,12 @@
             <a:picLocks noGrp="1" noChangeAspect="1"/>
           </p:cNvPicPr>
           <p:nvPr>
-            <p:ph type="pic" idx="14" sz="quarter"/>
+            <p:ph type="pic" idx="13" sz="quarter"/>
           </p:nvPr>
         </p:nvPicPr>
         <p:blipFill>
           <a:blip r:embed="rId2"/>
-          <a:srcRect t="6314" b="6314"/>
+          <a:srcRect t="6762" b="6762"/>
           <a:stretch>
             <a:fillRect/>
           </a:stretch>
@@ -4667,7 +5700,7 @@
             <a:spLocks noGrp="1"/>
           </p:cNvSpPr>
           <p:nvPr>
-            <p:ph type="body" idx="16" sz="quarter"/>
+            <p:ph type="body" idx="14" sz="quarter"/>
           </p:nvPr>
         </p:nvSpPr>
         <p:spPr/>
@@ -4678,97 +5711,71 @@
             <a:pPr/>
             <a:r>
               <a:rPr b="1"/>
-              <a:t>What We Bring</a:t>
+              <a:t>Client Success: Healthcare Insurance Provider</a:t>
             </a:r>
           </a:p>
           <a:p>
             <a:pPr lvl="1"/>
             <a:r>
-              <a:t>10+ years delivering AWS AI/ML solutions with proven results</a:t>
+              <a:rPr b="1"/>
+              <a:t>Client:</a:t>
+            </a:r>
+            <a:r>
+              <a:t> Regional health insurer processing 50,000+ claims monthly</a:t>
             </a:r>
           </a:p>
           <a:p>
             <a:pPr lvl="1"/>
             <a:r>
-              <a:t>50+ successful IDP implementations across healthcare, finance, government</a:t>
+              <a:rPr b="1"/>
+              <a:t>Challenge:</a:t>
+            </a:r>
+            <a:r>
+              <a:t> Manual processing taking 24-48 hours, 8% error rate, high labor costs limiting scalability</a:t>
             </a:r>
           </a:p>
           <a:p>
             <a:pPr lvl="1"/>
             <a:r>
-              <a:t>AWS Advanced Consulting Partner with Machine Learning Competency</a:t>
+              <a:rPr b="1"/>
+              <a:t>Solution:</a:t>
+            </a:r>
+            <a:r>
+              <a:t> AWS IDP with Textract, Comprehend, and A2I for automated claims processing</a:t>
             </a:r>
           </a:p>
           <a:p>
             <a:pPr lvl="1"/>
             <a:r>
-              <a:t>Certified solutions architects with Textract/Comprehend expertise</a:t>
+              <a:rPr b="1"/>
+              <a:t>Results:</a:t>
+            </a:r>
+            <a:r>
+              <a:t> 92% faster processing (24hrs → 2hrs), 99.2% accuracy, $2.1M annual savings, ROI in 11 months</a:t>
             </a:r>
           </a:p>
           <a:p>
             <a:pPr lvl="1"/>
             <a:r>
-              <a:t>Dedicated AI/ML practice with data scientists and ML engineers</a:t>
-            </a:r>
-          </a:p>
-        </p:txBody>
-      </p:sp>
-      <p:sp>
-        <p:nvSpPr>
-          <p:cNvPr id="5" name="Text Placeholder 4"/>
-          <p:cNvSpPr>
-            <a:spLocks noGrp="1"/>
-          </p:cNvSpPr>
-          <p:nvPr>
-            <p:ph type="body" idx="17" sz="quarter"/>
-          </p:nvPr>
-        </p:nvSpPr>
-        <p:spPr/>
-        <p:txBody>
-          <a:bodyPr/>
-          <a:lstStyle/>
-          <a:p>
-            <a:pPr/>
-            <a:r>
               <a:rPr b="1"/>
-              <a:t>Value to You</a:t>
-            </a:r>
-          </a:p>
-          <a:p>
-            <a:pPr lvl="1"/>
-            <a:r>
-              <a:t>Pre-built document processing templates accelerate deployment</a:t>
-            </a:r>
-          </a:p>
-          <a:p>
-            <a:pPr lvl="1"/>
-            <a:r>
-              <a:t>Proven AI model training methodology reduces time to accuracy</a:t>
-            </a:r>
-          </a:p>
-          <a:p>
-            <a:pPr lvl="1"/>
-            <a:r>
-              <a:t>Direct AWS ML specialist support through partner network</a:t>
-            </a:r>
-          </a:p>
-          <a:p>
-            <a:pPr lvl="1"/>
-            <a:r>
-              <a:t>Best practices from 50+ implementations avoid common pitfalls</a:t>
-            </a:r>
-          </a:p>
-          <a:p>
-            <a:pPr lvl="1"/>
-            <a:r>
-              <a:t>Comprehensive training ensures team self-sufficiency</a:t>
+              <a:t>Testimonial:</a:t>
+            </a:r>
+            <a:r>
+              <a:t> "The AI accuracy exceeded our expectations. We've redeployed staff to complex cases requiring human judgment, dramatically improving both efficiency and job satisfaction." — </a:t>
+            </a:r>
+            <a:r>
+              <a:rPr b="1"/>
+              <a:t>Sarah Martinez, VP Operations</a:t>
+            </a:r>
+            <a:r>
+              <a:t>, HealthFirst Insurance</a:t>
             </a:r>
           </a:p>
         </p:txBody>
       </p:sp>
       <p:pic>
         <p:nvPicPr>
-          <p:cNvPr id="6" name="Picture 5" descr="eo-framework-logo-real.png"/>
+          <p:cNvPr id="5" name="Picture 4" descr="eo-framework-logo-real.png"/>
           <p:cNvPicPr>
             <a:picLocks noChangeAspect="1"/>
           </p:cNvPicPr>
@@ -4823,10 +5830,8 @@
           <a:bodyPr/>
           <a:lstStyle/>
           <a:p>
-            <a:pPr algn="l"/>
-            <a:r>
-              <a:rPr b="1"/>
-              <a:t>Investment Summary</a:t>
+            <a:r>
+              <a:t>Our Partnership Advantage</a:t>
             </a:r>
           </a:p>
         </p:txBody>
@@ -4838,808 +5843,127 @@
             <a:picLocks noGrp="1" noChangeAspect="1"/>
           </p:cNvPicPr>
           <p:nvPr>
-            <p:ph type="pic" idx="13" sz="quarter"/>
+            <p:ph type="pic" idx="14" sz="quarter"/>
           </p:nvPr>
         </p:nvPicPr>
         <p:blipFill>
           <a:blip r:embed="rId2"/>
-          <a:srcRect t="6404" b="6404"/>
+          <a:srcRect t="6314" b="6314"/>
           <a:stretch>
             <a:fillRect/>
           </a:stretch>
         </p:blipFill>
         <p:spPr/>
       </p:pic>
-      <p:graphicFrame>
-        <p:nvGraphicFramePr>
-          <p:cNvPr id="4" name="Table Placeholder 3"/>
-          <p:cNvGraphicFramePr>
-            <a:graphicFrameLocks noGrp="1"/>
-          </p:cNvGraphicFramePr>
+      <p:sp>
+        <p:nvSpPr>
+          <p:cNvPr id="4" name="Text Placeholder 3"/>
+          <p:cNvSpPr>
+            <a:spLocks noGrp="1"/>
+          </p:cNvSpPr>
           <p:nvPr>
-            <p:ph type="tbl" idx="14" sz="quarter"/>
+            <p:ph type="body" idx="16" sz="quarter"/>
           </p:nvPr>
-        </p:nvGraphicFramePr>
-        <p:xfrm>
-          <a:off x="256855" y="677011"/>
-          <a:ext cx="8710929" cy="2225040"/>
-        </p:xfrm>
-        <a:graphic>
-          <a:graphicData uri="http://schemas.openxmlformats.org/drawingml/2006/table">
-            <a:tbl>
-              <a:tblPr firstRow="1" bandRow="1">
-                <a:tableStyleId>{5C22544A-7EE6-4342-B048-85BDC9FD1C3A}</a:tableStyleId>
-              </a:tblPr>
-              <a:tblGrid>
-                <a:gridCol w="1742186"/>
-                <a:gridCol w="1045311"/>
-                <a:gridCol w="2003514"/>
-                <a:gridCol w="1132421"/>
-                <a:gridCol w="871093"/>
-                <a:gridCol w="871093"/>
-                <a:gridCol w="1045311"/>
-              </a:tblGrid>
-              <a:tr h="370840">
-                <a:tc>
-                  <a:txBody>
-                    <a:bodyPr/>
-                    <a:lstStyle/>
-                    <a:p>
-                      <a:r>
-                        <a:rPr sz="1400">
-                          <a:solidFill>
-                            <a:srgbClr val="FFFFFF"/>
-                          </a:solidFill>
-                        </a:rPr>
-                        <a:t>Cost Category</a:t>
-                      </a:r>
-                    </a:p>
-                  </a:txBody>
-                  <a:tcPr>
-                    <a:solidFill>
-                      <a:srgbClr val="A01C02"/>
-                    </a:solidFill>
-                  </a:tcPr>
-                </a:tc>
-                <a:tc>
-                  <a:txBody>
-                    <a:bodyPr/>
-                    <a:lstStyle/>
-                    <a:p>
-                      <a:r>
-                        <a:rPr sz="1400">
-                          <a:solidFill>
-                            <a:srgbClr val="FFFFFF"/>
-                          </a:solidFill>
-                        </a:rPr>
-                        <a:t>Year 1 List</a:t>
-                      </a:r>
-                    </a:p>
-                  </a:txBody>
-                  <a:tcPr>
-                    <a:solidFill>
-                      <a:srgbClr val="A01C02"/>
-                    </a:solidFill>
-                  </a:tcPr>
-                </a:tc>
-                <a:tc>
-                  <a:txBody>
-                    <a:bodyPr/>
-                    <a:lstStyle/>
-                    <a:p>
-                      <a:r>
-                        <a:rPr sz="1400">
-                          <a:solidFill>
-                            <a:srgbClr val="FFFFFF"/>
-                          </a:solidFill>
-                        </a:rPr>
-                        <a:t>AWS/Partner Credits</a:t>
-                      </a:r>
-                    </a:p>
-                  </a:txBody>
-                  <a:tcPr>
-                    <a:solidFill>
-                      <a:srgbClr val="A01C02"/>
-                    </a:solidFill>
-                  </a:tcPr>
-                </a:tc>
-                <a:tc>
-                  <a:txBody>
-                    <a:bodyPr/>
-                    <a:lstStyle/>
-                    <a:p>
-                      <a:r>
-                        <a:rPr sz="1400">
-                          <a:solidFill>
-                            <a:srgbClr val="FFFFFF"/>
-                          </a:solidFill>
-                        </a:rPr>
-                        <a:t>Year 1 Net</a:t>
-                      </a:r>
-                    </a:p>
-                  </a:txBody>
-                  <a:tcPr>
-                    <a:solidFill>
-                      <a:srgbClr val="A01C02"/>
-                    </a:solidFill>
-                  </a:tcPr>
-                </a:tc>
-                <a:tc>
-                  <a:txBody>
-                    <a:bodyPr/>
-                    <a:lstStyle/>
-                    <a:p>
-                      <a:r>
-                        <a:rPr sz="1400">
-                          <a:solidFill>
-                            <a:srgbClr val="FFFFFF"/>
-                          </a:solidFill>
-                        </a:rPr>
-                        <a:t>Year 2</a:t>
-                      </a:r>
-                    </a:p>
-                  </a:txBody>
-                  <a:tcPr>
-                    <a:solidFill>
-                      <a:srgbClr val="A01C02"/>
-                    </a:solidFill>
-                  </a:tcPr>
-                </a:tc>
-                <a:tc>
-                  <a:txBody>
-                    <a:bodyPr/>
-                    <a:lstStyle/>
-                    <a:p>
-                      <a:r>
-                        <a:rPr sz="1400">
-                          <a:solidFill>
-                            <a:srgbClr val="FFFFFF"/>
-                          </a:solidFill>
-                        </a:rPr>
-                        <a:t>Year 3</a:t>
-                      </a:r>
-                    </a:p>
-                  </a:txBody>
-                  <a:tcPr>
-                    <a:solidFill>
-                      <a:srgbClr val="A01C02"/>
-                    </a:solidFill>
-                  </a:tcPr>
-                </a:tc>
-                <a:tc>
-                  <a:txBody>
-                    <a:bodyPr/>
-                    <a:lstStyle/>
-                    <a:p>
-                      <a:r>
-                        <a:rPr sz="1400">
-                          <a:solidFill>
-                            <a:srgbClr val="FFFFFF"/>
-                          </a:solidFill>
-                        </a:rPr>
-                        <a:t>3-Year Total</a:t>
-                      </a:r>
-                    </a:p>
-                  </a:txBody>
-                  <a:tcPr>
-                    <a:solidFill>
-                      <a:srgbClr val="A01C02"/>
-                    </a:solidFill>
-                  </a:tcPr>
-                </a:tc>
-              </a:tr>
-              <a:tr h="370840">
-                <a:tc>
-                  <a:txBody>
-                    <a:bodyPr/>
-                    <a:lstStyle/>
-                    <a:p>
-                      <a:r>
-                        <a:rPr sz="1100"/>
-                        <a:t>Professional Services</a:t>
-                      </a:r>
-                    </a:p>
-                  </a:txBody>
-                  <a:tcPr>
-                    <a:solidFill>
-                      <a:srgbClr val="E7E6E6"/>
-                    </a:solidFill>
-                  </a:tcPr>
-                </a:tc>
-                <a:tc>
-                  <a:txBody>
-                    <a:bodyPr/>
-                    <a:lstStyle/>
-                    <a:p>
-                      <a:r>
-                        <a:rPr sz="1100"/>
-                        <a:t>$82,250</a:t>
-                      </a:r>
-                    </a:p>
-                  </a:txBody>
-                  <a:tcPr>
-                    <a:solidFill>
-                      <a:srgbClr val="E7E6E6"/>
-                    </a:solidFill>
-                  </a:tcPr>
-                </a:tc>
-                <a:tc>
-                  <a:txBody>
-                    <a:bodyPr/>
-                    <a:lstStyle/>
-                    <a:p>
-                      <a:r>
-                        <a:rPr sz="1100"/>
-                        <a:t>($10,000)</a:t>
-                      </a:r>
-                    </a:p>
-                  </a:txBody>
-                  <a:tcPr>
-                    <a:solidFill>
-                      <a:srgbClr val="E7E6E6"/>
-                    </a:solidFill>
-                  </a:tcPr>
-                </a:tc>
-                <a:tc>
-                  <a:txBody>
-                    <a:bodyPr/>
-                    <a:lstStyle/>
-                    <a:p>
-                      <a:r>
-                        <a:rPr sz="1100"/>
-                        <a:t>$72,250</a:t>
-                      </a:r>
-                    </a:p>
-                  </a:txBody>
-                  <a:tcPr>
-                    <a:solidFill>
-                      <a:srgbClr val="E7E6E6"/>
-                    </a:solidFill>
-                  </a:tcPr>
-                </a:tc>
-                <a:tc>
-                  <a:txBody>
-                    <a:bodyPr/>
-                    <a:lstStyle/>
-                    <a:p>
-                      <a:r>
-                        <a:rPr sz="1100"/>
-                        <a:t>$0</a:t>
-                      </a:r>
-                    </a:p>
-                  </a:txBody>
-                  <a:tcPr>
-                    <a:solidFill>
-                      <a:srgbClr val="E7E6E6"/>
-                    </a:solidFill>
-                  </a:tcPr>
-                </a:tc>
-                <a:tc>
-                  <a:txBody>
-                    <a:bodyPr/>
-                    <a:lstStyle/>
-                    <a:p>
-                      <a:r>
-                        <a:rPr sz="1100"/>
-                        <a:t>$0</a:t>
-                      </a:r>
-                    </a:p>
-                  </a:txBody>
-                  <a:tcPr>
-                    <a:solidFill>
-                      <a:srgbClr val="E7E6E6"/>
-                    </a:solidFill>
-                  </a:tcPr>
-                </a:tc>
-                <a:tc>
-                  <a:txBody>
-                    <a:bodyPr/>
-                    <a:lstStyle/>
-                    <a:p>
-                      <a:r>
-                        <a:rPr sz="1100"/>
-                        <a:t>$72,250</a:t>
-                      </a:r>
-                    </a:p>
-                  </a:txBody>
-                  <a:tcPr>
-                    <a:solidFill>
-                      <a:srgbClr val="E7E6E6"/>
-                    </a:solidFill>
-                  </a:tcPr>
-                </a:tc>
-              </a:tr>
-              <a:tr h="370840">
-                <a:tc>
-                  <a:txBody>
-                    <a:bodyPr/>
-                    <a:lstStyle/>
-                    <a:p>
-                      <a:r>
-                        <a:rPr sz="1100"/>
-                        <a:t>Cloud Infrastructure</a:t>
-                      </a:r>
-                    </a:p>
-                  </a:txBody>
-                  <a:tcPr>
-                    <a:solidFill>
-                      <a:srgbClr val="E7E6E6"/>
-                    </a:solidFill>
-                  </a:tcPr>
-                </a:tc>
-                <a:tc>
-                  <a:txBody>
-                    <a:bodyPr/>
-                    <a:lstStyle/>
-                    <a:p>
-                      <a:r>
-                        <a:rPr sz="1100"/>
-                        <a:t>$26,830</a:t>
-                      </a:r>
-                    </a:p>
-                  </a:txBody>
-                  <a:tcPr>
-                    <a:solidFill>
-                      <a:srgbClr val="E7E6E6"/>
-                    </a:solidFill>
-                  </a:tcPr>
-                </a:tc>
-                <a:tc>
-                  <a:txBody>
-                    <a:bodyPr/>
-                    <a:lstStyle/>
-                    <a:p>
-                      <a:r>
-                        <a:rPr sz="1100"/>
-                        <a:t>($5,000)</a:t>
-                      </a:r>
-                    </a:p>
-                  </a:txBody>
-                  <a:tcPr>
-                    <a:solidFill>
-                      <a:srgbClr val="E7E6E6"/>
-                    </a:solidFill>
-                  </a:tcPr>
-                </a:tc>
-                <a:tc>
-                  <a:txBody>
-                    <a:bodyPr/>
-                    <a:lstStyle/>
-                    <a:p>
-                      <a:r>
-                        <a:rPr sz="1100"/>
-                        <a:t>$21,830</a:t>
-                      </a:r>
-                    </a:p>
-                  </a:txBody>
-                  <a:tcPr>
-                    <a:solidFill>
-                      <a:srgbClr val="E7E6E6"/>
-                    </a:solidFill>
-                  </a:tcPr>
-                </a:tc>
-                <a:tc>
-                  <a:txBody>
-                    <a:bodyPr/>
-                    <a:lstStyle/>
-                    <a:p>
-                      <a:r>
-                        <a:rPr sz="1100"/>
-                        <a:t>$26,830</a:t>
-                      </a:r>
-                    </a:p>
-                  </a:txBody>
-                  <a:tcPr>
-                    <a:solidFill>
-                      <a:srgbClr val="E7E6E6"/>
-                    </a:solidFill>
-                  </a:tcPr>
-                </a:tc>
-                <a:tc>
-                  <a:txBody>
-                    <a:bodyPr/>
-                    <a:lstStyle/>
-                    <a:p>
-                      <a:r>
-                        <a:rPr sz="1100"/>
-                        <a:t>$26,830</a:t>
-                      </a:r>
-                    </a:p>
-                  </a:txBody>
-                  <a:tcPr>
-                    <a:solidFill>
-                      <a:srgbClr val="E7E6E6"/>
-                    </a:solidFill>
-                  </a:tcPr>
-                </a:tc>
-                <a:tc>
-                  <a:txBody>
-                    <a:bodyPr/>
-                    <a:lstStyle/>
-                    <a:p>
-                      <a:r>
-                        <a:rPr sz="1100"/>
-                        <a:t>$75,490</a:t>
-                      </a:r>
-                    </a:p>
-                  </a:txBody>
-                  <a:tcPr>
-                    <a:solidFill>
-                      <a:srgbClr val="E7E6E6"/>
-                    </a:solidFill>
-                  </a:tcPr>
-                </a:tc>
-              </a:tr>
-              <a:tr h="370840">
-                <a:tc>
-                  <a:txBody>
-                    <a:bodyPr/>
-                    <a:lstStyle/>
-                    <a:p>
-                      <a:r>
-                        <a:rPr sz="1100"/>
-                        <a:t>Software Licenses &amp; Subscriptions</a:t>
-                      </a:r>
-                    </a:p>
-                  </a:txBody>
-                  <a:tcPr>
-                    <a:solidFill>
-                      <a:srgbClr val="E7E6E6"/>
-                    </a:solidFill>
-                  </a:tcPr>
-                </a:tc>
-                <a:tc>
-                  <a:txBody>
-                    <a:bodyPr/>
-                    <a:lstStyle/>
-                    <a:p>
-                      <a:r>
-                        <a:rPr sz="1100"/>
-                        <a:t>$2,784</a:t>
-                      </a:r>
-                    </a:p>
-                  </a:txBody>
-                  <a:tcPr>
-                    <a:solidFill>
-                      <a:srgbClr val="E7E6E6"/>
-                    </a:solidFill>
-                  </a:tcPr>
-                </a:tc>
-                <a:tc>
-                  <a:txBody>
-                    <a:bodyPr/>
-                    <a:lstStyle/>
-                    <a:p>
-                      <a:r>
-                        <a:rPr sz="1100"/>
-                        <a:t>$0</a:t>
-                      </a:r>
-                    </a:p>
-                  </a:txBody>
-                  <a:tcPr>
-                    <a:solidFill>
-                      <a:srgbClr val="E7E6E6"/>
-                    </a:solidFill>
-                  </a:tcPr>
-                </a:tc>
-                <a:tc>
-                  <a:txBody>
-                    <a:bodyPr/>
-                    <a:lstStyle/>
-                    <a:p>
-                      <a:r>
-                        <a:rPr sz="1100"/>
-                        <a:t>$2,784</a:t>
-                      </a:r>
-                    </a:p>
-                  </a:txBody>
-                  <a:tcPr>
-                    <a:solidFill>
-                      <a:srgbClr val="E7E6E6"/>
-                    </a:solidFill>
-                  </a:tcPr>
-                </a:tc>
-                <a:tc>
-                  <a:txBody>
-                    <a:bodyPr/>
-                    <a:lstStyle/>
-                    <a:p>
-                      <a:r>
-                        <a:rPr sz="1100"/>
-                        <a:t>$2,784</a:t>
-                      </a:r>
-                    </a:p>
-                  </a:txBody>
-                  <a:tcPr>
-                    <a:solidFill>
-                      <a:srgbClr val="E7E6E6"/>
-                    </a:solidFill>
-                  </a:tcPr>
-                </a:tc>
-                <a:tc>
-                  <a:txBody>
-                    <a:bodyPr/>
-                    <a:lstStyle/>
-                    <a:p>
-                      <a:r>
-                        <a:rPr sz="1100"/>
-                        <a:t>$2,784</a:t>
-                      </a:r>
-                    </a:p>
-                  </a:txBody>
-                  <a:tcPr>
-                    <a:solidFill>
-                      <a:srgbClr val="E7E6E6"/>
-                    </a:solidFill>
-                  </a:tcPr>
-                </a:tc>
-                <a:tc>
-                  <a:txBody>
-                    <a:bodyPr/>
-                    <a:lstStyle/>
-                    <a:p>
-                      <a:r>
-                        <a:rPr sz="1100"/>
-                        <a:t>$8,352</a:t>
-                      </a:r>
-                    </a:p>
-                  </a:txBody>
-                  <a:tcPr>
-                    <a:solidFill>
-                      <a:srgbClr val="E7E6E6"/>
-                    </a:solidFill>
-                  </a:tcPr>
-                </a:tc>
-              </a:tr>
-              <a:tr h="370840">
-                <a:tc>
-                  <a:txBody>
-                    <a:bodyPr/>
-                    <a:lstStyle/>
-                    <a:p>
-                      <a:r>
-                        <a:rPr sz="1100"/>
-                        <a:t>Support &amp; Maintenance</a:t>
-                      </a:r>
-                    </a:p>
-                  </a:txBody>
-                  <a:tcPr>
-                    <a:solidFill>
-                      <a:srgbClr val="E7E6E6"/>
-                    </a:solidFill>
-                  </a:tcPr>
-                </a:tc>
-                <a:tc>
-                  <a:txBody>
-                    <a:bodyPr/>
-                    <a:lstStyle/>
-                    <a:p>
-                      <a:r>
-                        <a:rPr sz="1100"/>
-                        <a:t>$4,087</a:t>
-                      </a:r>
-                    </a:p>
-                  </a:txBody>
-                  <a:tcPr>
-                    <a:solidFill>
-                      <a:srgbClr val="E7E6E6"/>
-                    </a:solidFill>
-                  </a:tcPr>
-                </a:tc>
-                <a:tc>
-                  <a:txBody>
-                    <a:bodyPr/>
-                    <a:lstStyle/>
-                    <a:p>
-                      <a:r>
-                        <a:rPr sz="1100"/>
-                        <a:t>$0</a:t>
-                      </a:r>
-                    </a:p>
-                  </a:txBody>
-                  <a:tcPr>
-                    <a:solidFill>
-                      <a:srgbClr val="E7E6E6"/>
-                    </a:solidFill>
-                  </a:tcPr>
-                </a:tc>
-                <a:tc>
-                  <a:txBody>
-                    <a:bodyPr/>
-                    <a:lstStyle/>
-                    <a:p>
-                      <a:r>
-                        <a:rPr sz="1100"/>
-                        <a:t>$4,087</a:t>
-                      </a:r>
-                    </a:p>
-                  </a:txBody>
-                  <a:tcPr>
-                    <a:solidFill>
-                      <a:srgbClr val="E7E6E6"/>
-                    </a:solidFill>
-                  </a:tcPr>
-                </a:tc>
-                <a:tc>
-                  <a:txBody>
-                    <a:bodyPr/>
-                    <a:lstStyle/>
-                    <a:p>
-                      <a:r>
-                        <a:rPr sz="1100"/>
-                        <a:t>$4,087</a:t>
-                      </a:r>
-                    </a:p>
-                  </a:txBody>
-                  <a:tcPr>
-                    <a:solidFill>
-                      <a:srgbClr val="E7E6E6"/>
-                    </a:solidFill>
-                  </a:tcPr>
-                </a:tc>
-                <a:tc>
-                  <a:txBody>
-                    <a:bodyPr/>
-                    <a:lstStyle/>
-                    <a:p>
-                      <a:r>
-                        <a:rPr sz="1100"/>
-                        <a:t>$4,087</a:t>
-                      </a:r>
-                    </a:p>
-                  </a:txBody>
-                  <a:tcPr>
-                    <a:solidFill>
-                      <a:srgbClr val="E7E6E6"/>
-                    </a:solidFill>
-                  </a:tcPr>
-                </a:tc>
-                <a:tc>
-                  <a:txBody>
-                    <a:bodyPr/>
-                    <a:lstStyle/>
-                    <a:p>
-                      <a:r>
-                        <a:rPr sz="1100"/>
-                        <a:t>$12,261</a:t>
-                      </a:r>
-                    </a:p>
-                  </a:txBody>
-                  <a:tcPr>
-                    <a:solidFill>
-                      <a:srgbClr val="E7E6E6"/>
-                    </a:solidFill>
-                  </a:tcPr>
-                </a:tc>
-              </a:tr>
-              <a:tr h="370840">
-                <a:tc>
-                  <a:txBody>
-                    <a:bodyPr/>
-                    <a:lstStyle/>
-                    <a:p>
-                      <a:r>
-                        <a:rPr b="1" sz="1100"/>
-                        <a:t>TOTAL INVESTMENT</a:t>
-                      </a:r>
-                    </a:p>
-                  </a:txBody>
-                  <a:tcPr>
-                    <a:solidFill>
-                      <a:srgbClr val="E7E6E6"/>
-                    </a:solidFill>
-                  </a:tcPr>
-                </a:tc>
-                <a:tc>
-                  <a:txBody>
-                    <a:bodyPr/>
-                    <a:lstStyle/>
-                    <a:p>
-                      <a:r>
-                        <a:rPr b="1" sz="1100"/>
-                        <a:t>$115,951</a:t>
-                      </a:r>
-                    </a:p>
-                  </a:txBody>
-                  <a:tcPr>
-                    <a:solidFill>
-                      <a:srgbClr val="E7E6E6"/>
-                    </a:solidFill>
-                  </a:tcPr>
-                </a:tc>
-                <a:tc>
-                  <a:txBody>
-                    <a:bodyPr/>
-                    <a:lstStyle/>
-                    <a:p>
-                      <a:r>
-                        <a:rPr b="1" sz="1100"/>
-                        <a:t>($15,000)</a:t>
-                      </a:r>
-                    </a:p>
-                  </a:txBody>
-                  <a:tcPr>
-                    <a:solidFill>
-                      <a:srgbClr val="E7E6E6"/>
-                    </a:solidFill>
-                  </a:tcPr>
-                </a:tc>
-                <a:tc>
-                  <a:txBody>
-                    <a:bodyPr/>
-                    <a:lstStyle/>
-                    <a:p>
-                      <a:r>
-                        <a:rPr b="1" sz="1100"/>
-                        <a:t>$100,951</a:t>
-                      </a:r>
-                    </a:p>
-                  </a:txBody>
-                  <a:tcPr>
-                    <a:solidFill>
-                      <a:srgbClr val="E7E6E6"/>
-                    </a:solidFill>
-                  </a:tcPr>
-                </a:tc>
-                <a:tc>
-                  <a:txBody>
-                    <a:bodyPr/>
-                    <a:lstStyle/>
-                    <a:p>
-                      <a:r>
-                        <a:rPr b="1" sz="1100"/>
-                        <a:t>$33,701</a:t>
-                      </a:r>
-                    </a:p>
-                  </a:txBody>
-                  <a:tcPr>
-                    <a:solidFill>
-                      <a:srgbClr val="E7E6E6"/>
-                    </a:solidFill>
-                  </a:tcPr>
-                </a:tc>
-                <a:tc>
-                  <a:txBody>
-                    <a:bodyPr/>
-                    <a:lstStyle/>
-                    <a:p>
-                      <a:r>
-                        <a:rPr b="1" sz="1100"/>
-                        <a:t>$33,701</a:t>
-                      </a:r>
-                    </a:p>
-                  </a:txBody>
-                  <a:tcPr>
-                    <a:solidFill>
-                      <a:srgbClr val="E7E6E6"/>
-                    </a:solidFill>
-                  </a:tcPr>
-                </a:tc>
-                <a:tc>
-                  <a:txBody>
-                    <a:bodyPr/>
-                    <a:lstStyle/>
-                    <a:p>
-                      <a:r>
-                        <a:rPr b="1" sz="1100"/>
-                        <a:t>$168,353</a:t>
-                      </a:r>
-                    </a:p>
-                  </a:txBody>
-                  <a:tcPr>
-                    <a:solidFill>
-                      <a:srgbClr val="E7E6E6"/>
-                    </a:solidFill>
-                  </a:tcPr>
-                </a:tc>
-              </a:tr>
-            </a:tbl>
-          </a:graphicData>
-        </a:graphic>
-      </p:graphicFrame>
+        </p:nvSpPr>
+        <p:spPr/>
+        <p:txBody>
+          <a:bodyPr/>
+          <a:lstStyle/>
+          <a:p>
+            <a:pPr/>
+            <a:r>
+              <a:rPr b="1"/>
+              <a:t>What We Bring</a:t>
+            </a:r>
+          </a:p>
+          <a:p>
+            <a:pPr lvl="1"/>
+            <a:r>
+              <a:t>10+ years delivering AWS AI/ML solutions with proven results</a:t>
+            </a:r>
+          </a:p>
+          <a:p>
+            <a:pPr lvl="1"/>
+            <a:r>
+              <a:t>50+ successful IDP implementations across healthcare, finance, government</a:t>
+            </a:r>
+          </a:p>
+          <a:p>
+            <a:pPr lvl="1"/>
+            <a:r>
+              <a:t>AWS Advanced Consulting Partner with Machine Learning Competency</a:t>
+            </a:r>
+          </a:p>
+          <a:p>
+            <a:pPr lvl="1"/>
+            <a:r>
+              <a:t>Certified solutions architects with Textract/Comprehend expertise</a:t>
+            </a:r>
+          </a:p>
+          <a:p>
+            <a:pPr lvl="1"/>
+            <a:r>
+              <a:t>Dedicated AI/ML practice with data scientists and ML engineers</a:t>
+            </a:r>
+          </a:p>
+        </p:txBody>
+      </p:sp>
+      <p:sp>
+        <p:nvSpPr>
+          <p:cNvPr id="5" name="Text Placeholder 4"/>
+          <p:cNvSpPr>
+            <a:spLocks noGrp="1"/>
+          </p:cNvSpPr>
+          <p:nvPr>
+            <p:ph type="body" idx="17" sz="quarter"/>
+          </p:nvPr>
+        </p:nvSpPr>
+        <p:spPr/>
+        <p:txBody>
+          <a:bodyPr/>
+          <a:lstStyle/>
+          <a:p>
+            <a:pPr/>
+            <a:r>
+              <a:rPr b="1"/>
+              <a:t>Value to You</a:t>
+            </a:r>
+          </a:p>
+          <a:p>
+            <a:pPr lvl="1"/>
+            <a:r>
+              <a:t>Pre-built document processing templates accelerate deployment</a:t>
+            </a:r>
+          </a:p>
+          <a:p>
+            <a:pPr lvl="1"/>
+            <a:r>
+              <a:t>Proven AI model training methodology reduces time to accuracy</a:t>
+            </a:r>
+          </a:p>
+          <a:p>
+            <a:pPr lvl="1"/>
+            <a:r>
+              <a:t>Direct AWS ML specialist support through partner network</a:t>
+            </a:r>
+          </a:p>
+          <a:p>
+            <a:pPr lvl="1"/>
+            <a:r>
+              <a:t>Best practices from 50+ implementations avoid common pitfalls</a:t>
+            </a:r>
+          </a:p>
+          <a:p>
+            <a:pPr lvl="1"/>
+            <a:r>
+              <a:t>Comprehensive training ensures team self-sufficiency</a:t>
+            </a:r>
+          </a:p>
+        </p:txBody>
+      </p:sp>
       <p:pic>
         <p:nvPicPr>
-          <p:cNvPr id="5" name="Picture 4" descr="eo-framework-logo-real.png"/>
+          <p:cNvPr id="6" name="Picture 5" descr="eo-framework-logo-real.png"/>
           <p:cNvPicPr>
             <a:picLocks noChangeAspect="1"/>
           </p:cNvPicPr>
@@ -5694,8 +6018,10 @@
           <a:bodyPr/>
           <a:lstStyle/>
           <a:p>
-            <a:r>
-              <a:t>Next Steps</a:t>
+            <a:pPr algn="l"/>
+            <a:r>
+              <a:rPr b="1"/>
+              <a:t>Investment Summary</a:t>
             </a:r>
           </a:p>
         </p:txBody>
@@ -5712,99 +6038,800 @@
         </p:nvPicPr>
         <p:blipFill>
           <a:blip r:embed="rId2"/>
-          <a:srcRect t="6762" b="6762"/>
+          <a:srcRect t="6404" b="6404"/>
           <a:stretch>
             <a:fillRect/>
           </a:stretch>
         </p:blipFill>
         <p:spPr/>
       </p:pic>
-      <p:sp>
-        <p:nvSpPr>
-          <p:cNvPr id="4" name="Text Placeholder 3"/>
-          <p:cNvSpPr>
-            <a:spLocks noGrp="1"/>
-          </p:cNvSpPr>
+      <p:graphicFrame>
+        <p:nvGraphicFramePr>
+          <p:cNvPr id="4" name="Table Placeholder 3"/>
+          <p:cNvGraphicFramePr>
+            <a:graphicFrameLocks noGrp="1"/>
+          </p:cNvGraphicFramePr>
           <p:nvPr>
-            <p:ph type="body" idx="14" sz="quarter"/>
+            <p:ph type="tbl" idx="14" sz="quarter"/>
           </p:nvPr>
-        </p:nvSpPr>
-        <p:spPr/>
-        <p:txBody>
-          <a:bodyPr/>
-          <a:lstStyle/>
-          <a:p>
-            <a:pPr/>
-            <a:r>
-              <a:rPr b="1"/>
-              <a:t>Decision:</a:t>
-            </a:r>
-            <a:r>
-              <a:t> Executive approval for pilot phase by [specific date]</a:t>
-            </a:r>
-          </a:p>
-          <a:p>
-            <a:pPr/>
-            <a:r>
-              <a:rPr b="1"/>
-              <a:t>Kickoff:</a:t>
-            </a:r>
-            <a:r>
-              <a:t> Target pilot start date [30 days from approval]</a:t>
-            </a:r>
-          </a:p>
-          <a:p>
-            <a:pPr/>
-            <a:r>
-              <a:rPr b="1"/>
-              <a:t>Team Formation:</a:t>
-            </a:r>
-            <a:r>
-              <a:t> Identify business SME, IT contact, document samples</a:t>
-            </a:r>
-          </a:p>
-          <a:p>
-            <a:pPr/>
-            <a:r>
-              <a:rPr b="1"/>
-              <a:t>Week 1:</a:t>
-            </a:r>
-            <a:r>
-              <a:t> Contract finalization and AWS account setup</a:t>
-            </a:r>
-          </a:p>
-          <a:p>
-            <a:pPr/>
-            <a:r>
-              <a:rPr b="1"/>
-              <a:t>Week 2:</a:t>
-            </a:r>
-            <a:r>
-              <a:t> Document sample collection and AI model configuration</a:t>
-            </a:r>
-          </a:p>
-          <a:p>
-            <a:pPr/>
-            <a:r>
-              <a:rPr b="1"/>
-              <a:t>Week 3:</a:t>
-            </a:r>
-            <a:r>
-              <a:t> Textract/Comprehend training and initial testing</a:t>
-            </a:r>
-          </a:p>
-          <a:p>
-            <a:pPr/>
-            <a:r>
-              <a:rPr b="1"/>
-              <a:t>Week 4:</a:t>
-            </a:r>
-            <a:r>
-              <a:t> First production documents processed with validation</a:t>
-            </a:r>
-          </a:p>
-        </p:txBody>
-      </p:sp>
+        </p:nvGraphicFramePr>
+        <p:xfrm>
+          <a:off x="256855" y="677011"/>
+          <a:ext cx="8710929" cy="2225040"/>
+        </p:xfrm>
+        <a:graphic>
+          <a:graphicData uri="http://schemas.openxmlformats.org/drawingml/2006/table">
+            <a:tbl>
+              <a:tblPr firstRow="1" bandRow="1">
+                <a:tableStyleId>{5C22544A-7EE6-4342-B048-85BDC9FD1C3A}</a:tableStyleId>
+              </a:tblPr>
+              <a:tblGrid>
+                <a:gridCol w="1742186"/>
+                <a:gridCol w="1045311"/>
+                <a:gridCol w="2003514"/>
+                <a:gridCol w="1132421"/>
+                <a:gridCol w="871093"/>
+                <a:gridCol w="871093"/>
+                <a:gridCol w="1045311"/>
+              </a:tblGrid>
+              <a:tr h="370840">
+                <a:tc>
+                  <a:txBody>
+                    <a:bodyPr/>
+                    <a:lstStyle/>
+                    <a:p>
+                      <a:r>
+                        <a:rPr sz="1400">
+                          <a:solidFill>
+                            <a:srgbClr val="FFFFFF"/>
+                          </a:solidFill>
+                        </a:rPr>
+                        <a:t>Cost Category</a:t>
+                      </a:r>
+                    </a:p>
+                  </a:txBody>
+                  <a:tcPr>
+                    <a:solidFill>
+                      <a:srgbClr val="A01C02"/>
+                    </a:solidFill>
+                  </a:tcPr>
+                </a:tc>
+                <a:tc>
+                  <a:txBody>
+                    <a:bodyPr/>
+                    <a:lstStyle/>
+                    <a:p>
+                      <a:r>
+                        <a:rPr sz="1400">
+                          <a:solidFill>
+                            <a:srgbClr val="FFFFFF"/>
+                          </a:solidFill>
+                        </a:rPr>
+                        <a:t>Year 1 List</a:t>
+                      </a:r>
+                    </a:p>
+                  </a:txBody>
+                  <a:tcPr>
+                    <a:solidFill>
+                      <a:srgbClr val="A01C02"/>
+                    </a:solidFill>
+                  </a:tcPr>
+                </a:tc>
+                <a:tc>
+                  <a:txBody>
+                    <a:bodyPr/>
+                    <a:lstStyle/>
+                    <a:p>
+                      <a:r>
+                        <a:rPr sz="1400">
+                          <a:solidFill>
+                            <a:srgbClr val="FFFFFF"/>
+                          </a:solidFill>
+                        </a:rPr>
+                        <a:t>AWS/Partner Credits</a:t>
+                      </a:r>
+                    </a:p>
+                  </a:txBody>
+                  <a:tcPr>
+                    <a:solidFill>
+                      <a:srgbClr val="A01C02"/>
+                    </a:solidFill>
+                  </a:tcPr>
+                </a:tc>
+                <a:tc>
+                  <a:txBody>
+                    <a:bodyPr/>
+                    <a:lstStyle/>
+                    <a:p>
+                      <a:r>
+                        <a:rPr sz="1400">
+                          <a:solidFill>
+                            <a:srgbClr val="FFFFFF"/>
+                          </a:solidFill>
+                        </a:rPr>
+                        <a:t>Year 1 Net</a:t>
+                      </a:r>
+                    </a:p>
+                  </a:txBody>
+                  <a:tcPr>
+                    <a:solidFill>
+                      <a:srgbClr val="A01C02"/>
+                    </a:solidFill>
+                  </a:tcPr>
+                </a:tc>
+                <a:tc>
+                  <a:txBody>
+                    <a:bodyPr/>
+                    <a:lstStyle/>
+                    <a:p>
+                      <a:r>
+                        <a:rPr sz="1400">
+                          <a:solidFill>
+                            <a:srgbClr val="FFFFFF"/>
+                          </a:solidFill>
+                        </a:rPr>
+                        <a:t>Year 2</a:t>
+                      </a:r>
+                    </a:p>
+                  </a:txBody>
+                  <a:tcPr>
+                    <a:solidFill>
+                      <a:srgbClr val="A01C02"/>
+                    </a:solidFill>
+                  </a:tcPr>
+                </a:tc>
+                <a:tc>
+                  <a:txBody>
+                    <a:bodyPr/>
+                    <a:lstStyle/>
+                    <a:p>
+                      <a:r>
+                        <a:rPr sz="1400">
+                          <a:solidFill>
+                            <a:srgbClr val="FFFFFF"/>
+                          </a:solidFill>
+                        </a:rPr>
+                        <a:t>Year 3</a:t>
+                      </a:r>
+                    </a:p>
+                  </a:txBody>
+                  <a:tcPr>
+                    <a:solidFill>
+                      <a:srgbClr val="A01C02"/>
+                    </a:solidFill>
+                  </a:tcPr>
+                </a:tc>
+                <a:tc>
+                  <a:txBody>
+                    <a:bodyPr/>
+                    <a:lstStyle/>
+                    <a:p>
+                      <a:r>
+                        <a:rPr sz="1400">
+                          <a:solidFill>
+                            <a:srgbClr val="FFFFFF"/>
+                          </a:solidFill>
+                        </a:rPr>
+                        <a:t>3-Year Total</a:t>
+                      </a:r>
+                    </a:p>
+                  </a:txBody>
+                  <a:tcPr>
+                    <a:solidFill>
+                      <a:srgbClr val="A01C02"/>
+                    </a:solidFill>
+                  </a:tcPr>
+                </a:tc>
+              </a:tr>
+              <a:tr h="370840">
+                <a:tc>
+                  <a:txBody>
+                    <a:bodyPr/>
+                    <a:lstStyle/>
+                    <a:p>
+                      <a:r>
+                        <a:rPr sz="1100"/>
+                        <a:t>Professional Services</a:t>
+                      </a:r>
+                    </a:p>
+                  </a:txBody>
+                  <a:tcPr>
+                    <a:solidFill>
+                      <a:srgbClr val="E7E6E6"/>
+                    </a:solidFill>
+                  </a:tcPr>
+                </a:tc>
+                <a:tc>
+                  <a:txBody>
+                    <a:bodyPr/>
+                    <a:lstStyle/>
+                    <a:p>
+                      <a:r>
+                        <a:rPr sz="1100"/>
+                        <a:t>$82,250</a:t>
+                      </a:r>
+                    </a:p>
+                  </a:txBody>
+                  <a:tcPr>
+                    <a:solidFill>
+                      <a:srgbClr val="E7E6E6"/>
+                    </a:solidFill>
+                  </a:tcPr>
+                </a:tc>
+                <a:tc>
+                  <a:txBody>
+                    <a:bodyPr/>
+                    <a:lstStyle/>
+                    <a:p>
+                      <a:r>
+                        <a:rPr sz="1100"/>
+                        <a:t>($10,000)</a:t>
+                      </a:r>
+                    </a:p>
+                  </a:txBody>
+                  <a:tcPr>
+                    <a:solidFill>
+                      <a:srgbClr val="E7E6E6"/>
+                    </a:solidFill>
+                  </a:tcPr>
+                </a:tc>
+                <a:tc>
+                  <a:txBody>
+                    <a:bodyPr/>
+                    <a:lstStyle/>
+                    <a:p>
+                      <a:r>
+                        <a:rPr sz="1100"/>
+                        <a:t>$72,250</a:t>
+                      </a:r>
+                    </a:p>
+                  </a:txBody>
+                  <a:tcPr>
+                    <a:solidFill>
+                      <a:srgbClr val="E7E6E6"/>
+                    </a:solidFill>
+                  </a:tcPr>
+                </a:tc>
+                <a:tc>
+                  <a:txBody>
+                    <a:bodyPr/>
+                    <a:lstStyle/>
+                    <a:p>
+                      <a:r>
+                        <a:rPr sz="1100"/>
+                        <a:t>$0</a:t>
+                      </a:r>
+                    </a:p>
+                  </a:txBody>
+                  <a:tcPr>
+                    <a:solidFill>
+                      <a:srgbClr val="E7E6E6"/>
+                    </a:solidFill>
+                  </a:tcPr>
+                </a:tc>
+                <a:tc>
+                  <a:txBody>
+                    <a:bodyPr/>
+                    <a:lstStyle/>
+                    <a:p>
+                      <a:r>
+                        <a:rPr sz="1100"/>
+                        <a:t>$0</a:t>
+                      </a:r>
+                    </a:p>
+                  </a:txBody>
+                  <a:tcPr>
+                    <a:solidFill>
+                      <a:srgbClr val="E7E6E6"/>
+                    </a:solidFill>
+                  </a:tcPr>
+                </a:tc>
+                <a:tc>
+                  <a:txBody>
+                    <a:bodyPr/>
+                    <a:lstStyle/>
+                    <a:p>
+                      <a:r>
+                        <a:rPr sz="1100"/>
+                        <a:t>$72,250</a:t>
+                      </a:r>
+                    </a:p>
+                  </a:txBody>
+                  <a:tcPr>
+                    <a:solidFill>
+                      <a:srgbClr val="E7E6E6"/>
+                    </a:solidFill>
+                  </a:tcPr>
+                </a:tc>
+              </a:tr>
+              <a:tr h="370840">
+                <a:tc>
+                  <a:txBody>
+                    <a:bodyPr/>
+                    <a:lstStyle/>
+                    <a:p>
+                      <a:r>
+                        <a:rPr sz="1100"/>
+                        <a:t>Cloud Infrastructure</a:t>
+                      </a:r>
+                    </a:p>
+                  </a:txBody>
+                  <a:tcPr>
+                    <a:solidFill>
+                      <a:srgbClr val="E7E6E6"/>
+                    </a:solidFill>
+                  </a:tcPr>
+                </a:tc>
+                <a:tc>
+                  <a:txBody>
+                    <a:bodyPr/>
+                    <a:lstStyle/>
+                    <a:p>
+                      <a:r>
+                        <a:rPr sz="1100"/>
+                        <a:t>$26,830</a:t>
+                      </a:r>
+                    </a:p>
+                  </a:txBody>
+                  <a:tcPr>
+                    <a:solidFill>
+                      <a:srgbClr val="E7E6E6"/>
+                    </a:solidFill>
+                  </a:tcPr>
+                </a:tc>
+                <a:tc>
+                  <a:txBody>
+                    <a:bodyPr/>
+                    <a:lstStyle/>
+                    <a:p>
+                      <a:r>
+                        <a:rPr sz="1100"/>
+                        <a:t>($5,000)</a:t>
+                      </a:r>
+                    </a:p>
+                  </a:txBody>
+                  <a:tcPr>
+                    <a:solidFill>
+                      <a:srgbClr val="E7E6E6"/>
+                    </a:solidFill>
+                  </a:tcPr>
+                </a:tc>
+                <a:tc>
+                  <a:txBody>
+                    <a:bodyPr/>
+                    <a:lstStyle/>
+                    <a:p>
+                      <a:r>
+                        <a:rPr sz="1100"/>
+                        <a:t>$21,830</a:t>
+                      </a:r>
+                    </a:p>
+                  </a:txBody>
+                  <a:tcPr>
+                    <a:solidFill>
+                      <a:srgbClr val="E7E6E6"/>
+                    </a:solidFill>
+                  </a:tcPr>
+                </a:tc>
+                <a:tc>
+                  <a:txBody>
+                    <a:bodyPr/>
+                    <a:lstStyle/>
+                    <a:p>
+                      <a:r>
+                        <a:rPr sz="1100"/>
+                        <a:t>$26,830</a:t>
+                      </a:r>
+                    </a:p>
+                  </a:txBody>
+                  <a:tcPr>
+                    <a:solidFill>
+                      <a:srgbClr val="E7E6E6"/>
+                    </a:solidFill>
+                  </a:tcPr>
+                </a:tc>
+                <a:tc>
+                  <a:txBody>
+                    <a:bodyPr/>
+                    <a:lstStyle/>
+                    <a:p>
+                      <a:r>
+                        <a:rPr sz="1100"/>
+                        <a:t>$26,830</a:t>
+                      </a:r>
+                    </a:p>
+                  </a:txBody>
+                  <a:tcPr>
+                    <a:solidFill>
+                      <a:srgbClr val="E7E6E6"/>
+                    </a:solidFill>
+                  </a:tcPr>
+                </a:tc>
+                <a:tc>
+                  <a:txBody>
+                    <a:bodyPr/>
+                    <a:lstStyle/>
+                    <a:p>
+                      <a:r>
+                        <a:rPr sz="1100"/>
+                        <a:t>$75,490</a:t>
+                      </a:r>
+                    </a:p>
+                  </a:txBody>
+                  <a:tcPr>
+                    <a:solidFill>
+                      <a:srgbClr val="E7E6E6"/>
+                    </a:solidFill>
+                  </a:tcPr>
+                </a:tc>
+              </a:tr>
+              <a:tr h="370840">
+                <a:tc>
+                  <a:txBody>
+                    <a:bodyPr/>
+                    <a:lstStyle/>
+                    <a:p>
+                      <a:r>
+                        <a:rPr sz="1100"/>
+                        <a:t>Software Licenses &amp; Subscriptions</a:t>
+                      </a:r>
+                    </a:p>
+                  </a:txBody>
+                  <a:tcPr>
+                    <a:solidFill>
+                      <a:srgbClr val="E7E6E6"/>
+                    </a:solidFill>
+                  </a:tcPr>
+                </a:tc>
+                <a:tc>
+                  <a:txBody>
+                    <a:bodyPr/>
+                    <a:lstStyle/>
+                    <a:p>
+                      <a:r>
+                        <a:rPr sz="1100"/>
+                        <a:t>$2,784</a:t>
+                      </a:r>
+                    </a:p>
+                  </a:txBody>
+                  <a:tcPr>
+                    <a:solidFill>
+                      <a:srgbClr val="E7E6E6"/>
+                    </a:solidFill>
+                  </a:tcPr>
+                </a:tc>
+                <a:tc>
+                  <a:txBody>
+                    <a:bodyPr/>
+                    <a:lstStyle/>
+                    <a:p>
+                      <a:r>
+                        <a:rPr sz="1100"/>
+                        <a:t>$0</a:t>
+                      </a:r>
+                    </a:p>
+                  </a:txBody>
+                  <a:tcPr>
+                    <a:solidFill>
+                      <a:srgbClr val="E7E6E6"/>
+                    </a:solidFill>
+                  </a:tcPr>
+                </a:tc>
+                <a:tc>
+                  <a:txBody>
+                    <a:bodyPr/>
+                    <a:lstStyle/>
+                    <a:p>
+                      <a:r>
+                        <a:rPr sz="1100"/>
+                        <a:t>$2,784</a:t>
+                      </a:r>
+                    </a:p>
+                  </a:txBody>
+                  <a:tcPr>
+                    <a:solidFill>
+                      <a:srgbClr val="E7E6E6"/>
+                    </a:solidFill>
+                  </a:tcPr>
+                </a:tc>
+                <a:tc>
+                  <a:txBody>
+                    <a:bodyPr/>
+                    <a:lstStyle/>
+                    <a:p>
+                      <a:r>
+                        <a:rPr sz="1100"/>
+                        <a:t>$2,784</a:t>
+                      </a:r>
+                    </a:p>
+                  </a:txBody>
+                  <a:tcPr>
+                    <a:solidFill>
+                      <a:srgbClr val="E7E6E6"/>
+                    </a:solidFill>
+                  </a:tcPr>
+                </a:tc>
+                <a:tc>
+                  <a:txBody>
+                    <a:bodyPr/>
+                    <a:lstStyle/>
+                    <a:p>
+                      <a:r>
+                        <a:rPr sz="1100"/>
+                        <a:t>$2,784</a:t>
+                      </a:r>
+                    </a:p>
+                  </a:txBody>
+                  <a:tcPr>
+                    <a:solidFill>
+                      <a:srgbClr val="E7E6E6"/>
+                    </a:solidFill>
+                  </a:tcPr>
+                </a:tc>
+                <a:tc>
+                  <a:txBody>
+                    <a:bodyPr/>
+                    <a:lstStyle/>
+                    <a:p>
+                      <a:r>
+                        <a:rPr sz="1100"/>
+                        <a:t>$8,352</a:t>
+                      </a:r>
+                    </a:p>
+                  </a:txBody>
+                  <a:tcPr>
+                    <a:solidFill>
+                      <a:srgbClr val="E7E6E6"/>
+                    </a:solidFill>
+                  </a:tcPr>
+                </a:tc>
+              </a:tr>
+              <a:tr h="370840">
+                <a:tc>
+                  <a:txBody>
+                    <a:bodyPr/>
+                    <a:lstStyle/>
+                    <a:p>
+                      <a:r>
+                        <a:rPr sz="1100"/>
+                        <a:t>Support &amp; Maintenance</a:t>
+                      </a:r>
+                    </a:p>
+                  </a:txBody>
+                  <a:tcPr>
+                    <a:solidFill>
+                      <a:srgbClr val="E7E6E6"/>
+                    </a:solidFill>
+                  </a:tcPr>
+                </a:tc>
+                <a:tc>
+                  <a:txBody>
+                    <a:bodyPr/>
+                    <a:lstStyle/>
+                    <a:p>
+                      <a:r>
+                        <a:rPr sz="1100"/>
+                        <a:t>$4,087</a:t>
+                      </a:r>
+                    </a:p>
+                  </a:txBody>
+                  <a:tcPr>
+                    <a:solidFill>
+                      <a:srgbClr val="E7E6E6"/>
+                    </a:solidFill>
+                  </a:tcPr>
+                </a:tc>
+                <a:tc>
+                  <a:txBody>
+                    <a:bodyPr/>
+                    <a:lstStyle/>
+                    <a:p>
+                      <a:r>
+                        <a:rPr sz="1100"/>
+                        <a:t>$0</a:t>
+                      </a:r>
+                    </a:p>
+                  </a:txBody>
+                  <a:tcPr>
+                    <a:solidFill>
+                      <a:srgbClr val="E7E6E6"/>
+                    </a:solidFill>
+                  </a:tcPr>
+                </a:tc>
+                <a:tc>
+                  <a:txBody>
+                    <a:bodyPr/>
+                    <a:lstStyle/>
+                    <a:p>
+                      <a:r>
+                        <a:rPr sz="1100"/>
+                        <a:t>$4,087</a:t>
+                      </a:r>
+                    </a:p>
+                  </a:txBody>
+                  <a:tcPr>
+                    <a:solidFill>
+                      <a:srgbClr val="E7E6E6"/>
+                    </a:solidFill>
+                  </a:tcPr>
+                </a:tc>
+                <a:tc>
+                  <a:txBody>
+                    <a:bodyPr/>
+                    <a:lstStyle/>
+                    <a:p>
+                      <a:r>
+                        <a:rPr sz="1100"/>
+                        <a:t>$4,087</a:t>
+                      </a:r>
+                    </a:p>
+                  </a:txBody>
+                  <a:tcPr>
+                    <a:solidFill>
+                      <a:srgbClr val="E7E6E6"/>
+                    </a:solidFill>
+                  </a:tcPr>
+                </a:tc>
+                <a:tc>
+                  <a:txBody>
+                    <a:bodyPr/>
+                    <a:lstStyle/>
+                    <a:p>
+                      <a:r>
+                        <a:rPr sz="1100"/>
+                        <a:t>$4,087</a:t>
+                      </a:r>
+                    </a:p>
+                  </a:txBody>
+                  <a:tcPr>
+                    <a:solidFill>
+                      <a:srgbClr val="E7E6E6"/>
+                    </a:solidFill>
+                  </a:tcPr>
+                </a:tc>
+                <a:tc>
+                  <a:txBody>
+                    <a:bodyPr/>
+                    <a:lstStyle/>
+                    <a:p>
+                      <a:r>
+                        <a:rPr sz="1100"/>
+                        <a:t>$12,261</a:t>
+                      </a:r>
+                    </a:p>
+                  </a:txBody>
+                  <a:tcPr>
+                    <a:solidFill>
+                      <a:srgbClr val="E7E6E6"/>
+                    </a:solidFill>
+                  </a:tcPr>
+                </a:tc>
+              </a:tr>
+              <a:tr h="370840">
+                <a:tc>
+                  <a:txBody>
+                    <a:bodyPr/>
+                    <a:lstStyle/>
+                    <a:p>
+                      <a:r>
+                        <a:rPr b="1" sz="1100"/>
+                        <a:t>TOTAL INVESTMENT</a:t>
+                      </a:r>
+                    </a:p>
+                  </a:txBody>
+                  <a:tcPr>
+                    <a:solidFill>
+                      <a:srgbClr val="E7E6E6"/>
+                    </a:solidFill>
+                  </a:tcPr>
+                </a:tc>
+                <a:tc>
+                  <a:txBody>
+                    <a:bodyPr/>
+                    <a:lstStyle/>
+                    <a:p>
+                      <a:r>
+                        <a:rPr b="1" sz="1100"/>
+                        <a:t>$115,951</a:t>
+                      </a:r>
+                    </a:p>
+                  </a:txBody>
+                  <a:tcPr>
+                    <a:solidFill>
+                      <a:srgbClr val="E7E6E6"/>
+                    </a:solidFill>
+                  </a:tcPr>
+                </a:tc>
+                <a:tc>
+                  <a:txBody>
+                    <a:bodyPr/>
+                    <a:lstStyle/>
+                    <a:p>
+                      <a:r>
+                        <a:rPr b="1" sz="1100"/>
+                        <a:t>($15,000)</a:t>
+                      </a:r>
+                    </a:p>
+                  </a:txBody>
+                  <a:tcPr>
+                    <a:solidFill>
+                      <a:srgbClr val="E7E6E6"/>
+                    </a:solidFill>
+                  </a:tcPr>
+                </a:tc>
+                <a:tc>
+                  <a:txBody>
+                    <a:bodyPr/>
+                    <a:lstStyle/>
+                    <a:p>
+                      <a:r>
+                        <a:rPr b="1" sz="1100"/>
+                        <a:t>$100,951</a:t>
+                      </a:r>
+                    </a:p>
+                  </a:txBody>
+                  <a:tcPr>
+                    <a:solidFill>
+                      <a:srgbClr val="E7E6E6"/>
+                    </a:solidFill>
+                  </a:tcPr>
+                </a:tc>
+                <a:tc>
+                  <a:txBody>
+                    <a:bodyPr/>
+                    <a:lstStyle/>
+                    <a:p>
+                      <a:r>
+                        <a:rPr b="1" sz="1100"/>
+                        <a:t>$33,701</a:t>
+                      </a:r>
+                    </a:p>
+                  </a:txBody>
+                  <a:tcPr>
+                    <a:solidFill>
+                      <a:srgbClr val="E7E6E6"/>
+                    </a:solidFill>
+                  </a:tcPr>
+                </a:tc>
+                <a:tc>
+                  <a:txBody>
+                    <a:bodyPr/>
+                    <a:lstStyle/>
+                    <a:p>
+                      <a:r>
+                        <a:rPr b="1" sz="1100"/>
+                        <a:t>$33,701</a:t>
+                      </a:r>
+                    </a:p>
+                  </a:txBody>
+                  <a:tcPr>
+                    <a:solidFill>
+                      <a:srgbClr val="E7E6E6"/>
+                    </a:solidFill>
+                  </a:tcPr>
+                </a:tc>
+                <a:tc>
+                  <a:txBody>
+                    <a:bodyPr/>
+                    <a:lstStyle/>
+                    <a:p>
+                      <a:r>
+                        <a:rPr b="1" sz="1100"/>
+                        <a:t>$168,353</a:t>
+                      </a:r>
+                    </a:p>
+                  </a:txBody>
+                  <a:tcPr>
+                    <a:solidFill>
+                      <a:srgbClr val="E7E6E6"/>
+                    </a:solidFill>
+                  </a:tcPr>
+                </a:tc>
+              </a:tr>
+            </a:tbl>
+          </a:graphicData>
+        </a:graphic>
+      </p:graphicFrame>
       <p:pic>
         <p:nvPicPr>
           <p:cNvPr id="5" name="Picture 4" descr="eo-framework-logo-real.png"/>

</xml_diff>

<commit_message>
Fix logo paths in solution-briefing.md files to use correct relative format
- Updated AWS IDP solution-briefing.md logo paths from eof-tools/... to ../../assets/logos/...
- Updated GitHub Advanced Security solution-briefing.md logo paths
- Updated GitHub Actions Enterprise CI/CD solution-briefing.md logo paths
- Updated solution-template solution-briefing.md logo paths
- Regenerated AWS IDP Office documents with corrected logo paths

The converter resolves logo paths relative to the markdown file location (presales/raw/),
so ../../assets/logos/ correctly points to the solution's assets/logos/ directory.
</commit_message>
<xml_diff>
--- a/solutions/aws/ai/intelligent-document-processing/presales/solution-briefing.pptx
+++ b/solutions/aws/ai/intelligent-document-processing/presales/solution-briefing.pptx
@@ -3270,18 +3270,6 @@
       <p:grpSpPr/>
       <p:sp>
         <p:nvSpPr>
-          <p:cNvPr id="2" name="Picture Placeholder 1"/>
-          <p:cNvSpPr>
-            <a:spLocks noGrp="1"/>
-          </p:cNvSpPr>
-          <p:nvPr>
-            <p:ph type="pic" idx="10" sz="quarter"/>
-          </p:nvPr>
-        </p:nvSpPr>
-        <p:spPr/>
-      </p:sp>
-      <p:sp>
-        <p:nvSpPr>
           <p:cNvPr id="3" name="Text Placeholder 2"/>
           <p:cNvSpPr>
             <a:spLocks noGrp="1"/>
@@ -3303,18 +3291,6 @@
       </p:sp>
       <p:sp>
         <p:nvSpPr>
-          <p:cNvPr id="4" name="Picture Placeholder 3"/>
-          <p:cNvSpPr>
-            <a:spLocks noGrp="1"/>
-          </p:cNvSpPr>
-          <p:nvPr>
-            <p:ph type="pic" idx="13" sz="quarter"/>
-          </p:nvPr>
-        </p:nvSpPr>
-        <p:spPr/>
-      </p:sp>
-      <p:sp>
-        <p:nvSpPr>
           <p:cNvPr id="5" name="Text Placeholder 4"/>
           <p:cNvSpPr>
             <a:spLocks noGrp="1"/>
@@ -3355,6 +3331,78 @@
           </a:p>
         </p:txBody>
       </p:sp>
+      <p:pic>
+        <p:nvPicPr>
+          <p:cNvPr id="7" name="Picture 6" descr="client_logo.png"/>
+          <p:cNvPicPr>
+            <a:picLocks noChangeAspect="1"/>
+          </p:cNvPicPr>
+          <p:nvPr/>
+        </p:nvPicPr>
+        <p:blipFill>
+          <a:blip r:embed="rId2"/>
+          <a:stretch>
+            <a:fillRect/>
+          </a:stretch>
+        </p:blipFill>
+        <p:spPr>
+          <a:xfrm>
+            <a:off x="2180492" y="171206"/>
+            <a:ext cx="3978520" cy="1314694"/>
+          </a:xfrm>
+          <a:prstGeom prst="rect">
+            <a:avLst/>
+          </a:prstGeom>
+        </p:spPr>
+      </p:pic>
+      <p:pic>
+        <p:nvPicPr>
+          <p:cNvPr id="8" name="Picture 7" descr="consulting_company_logo.png"/>
+          <p:cNvPicPr>
+            <a:picLocks noChangeAspect="1"/>
+          </p:cNvPicPr>
+          <p:nvPr/>
+        </p:nvPicPr>
+        <p:blipFill>
+          <a:blip r:embed="rId3"/>
+          <a:stretch>
+            <a:fillRect/>
+          </a:stretch>
+        </p:blipFill>
+        <p:spPr>
+          <a:xfrm>
+            <a:off x="313591" y="4536078"/>
+            <a:ext cx="2099897" cy="529698"/>
+          </a:xfrm>
+          <a:prstGeom prst="rect">
+            <a:avLst/>
+          </a:prstGeom>
+        </p:spPr>
+      </p:pic>
+      <p:pic>
+        <p:nvPicPr>
+          <p:cNvPr id="9" name="Picture 8" descr="eo-framework-logo-real.png"/>
+          <p:cNvPicPr>
+            <a:picLocks noChangeAspect="1"/>
+          </p:cNvPicPr>
+          <p:nvPr/>
+        </p:nvPicPr>
+        <p:blipFill>
+          <a:blip r:embed="rId4"/>
+          <a:stretch>
+            <a:fillRect/>
+          </a:stretch>
+        </p:blipFill>
+        <p:spPr>
+          <a:xfrm>
+            <a:off x="6684264" y="4535424"/>
+            <a:ext cx="2139696" cy="530352"/>
+          </a:xfrm>
+          <a:prstGeom prst="rect">
+            <a:avLst/>
+          </a:prstGeom>
+        </p:spPr>
+      </p:pic>
     </p:spTree>
   </p:cSld>
   <p:clrMapOvr>
@@ -3375,18 +3423,6 @@
       <p:grpSpPr/>
       <p:sp>
         <p:nvSpPr>
-          <p:cNvPr id="2" name="Picture Placeholder 1"/>
-          <p:cNvSpPr>
-            <a:spLocks noGrp="1"/>
-          </p:cNvSpPr>
-          <p:nvPr>
-            <p:ph type="pic" idx="13" sz="quarter"/>
-          </p:nvPr>
-        </p:nvSpPr>
-        <p:spPr/>
-      </p:sp>
-      <p:sp>
-        <p:nvSpPr>
           <p:cNvPr id="3" name="Text Placeholder 2"/>
           <p:cNvSpPr>
             <a:spLocks noGrp="1"/>
@@ -3502,6 +3538,30 @@
           </a:p>
         </p:txBody>
       </p:sp>
+      <p:pic>
+        <p:nvPicPr>
+          <p:cNvPr id="6" name="Picture 5" descr="consulting_company_logo.png"/>
+          <p:cNvPicPr>
+            <a:picLocks noChangeAspect="1"/>
+          </p:cNvPicPr>
+          <p:nvPr/>
+        </p:nvPicPr>
+        <p:blipFill>
+          <a:blip r:embed="rId2"/>
+          <a:stretch>
+            <a:fillRect/>
+          </a:stretch>
+        </p:blipFill>
+        <p:spPr>
+          <a:xfrm>
+            <a:off x="313593" y="4536078"/>
+            <a:ext cx="2143858" cy="529698"/>
+          </a:xfrm>
+          <a:prstGeom prst="rect">
+            <a:avLst/>
+          </a:prstGeom>
+        </p:spPr>
+      </p:pic>
     </p:spTree>
   </p:cSld>
   <p:clrMapOvr>
@@ -3522,18 +3582,6 @@
       <p:grpSpPr/>
       <p:sp>
         <p:nvSpPr>
-          <p:cNvPr id="2" name="Picture Placeholder 1"/>
-          <p:cNvSpPr>
-            <a:spLocks noGrp="1"/>
-          </p:cNvSpPr>
-          <p:nvPr>
-            <p:ph type="pic" idx="10" sz="quarter"/>
-          </p:nvPr>
-        </p:nvSpPr>
-        <p:spPr/>
-      </p:sp>
-      <p:sp>
-        <p:nvSpPr>
           <p:cNvPr id="3" name="Text Placeholder 2"/>
           <p:cNvSpPr>
             <a:spLocks noGrp="1"/>
@@ -3555,18 +3603,6 @@
       </p:sp>
       <p:sp>
         <p:nvSpPr>
-          <p:cNvPr id="4" name="Picture Placeholder 3"/>
-          <p:cNvSpPr>
-            <a:spLocks noGrp="1"/>
-          </p:cNvSpPr>
-          <p:nvPr>
-            <p:ph type="pic" idx="13" sz="quarter"/>
-          </p:nvPr>
-        </p:nvSpPr>
-        <p:spPr/>
-      </p:sp>
-      <p:sp>
-        <p:nvSpPr>
           <p:cNvPr id="5" name="Text Placeholder 4"/>
           <p:cNvSpPr>
             <a:spLocks noGrp="1"/>
@@ -3599,6 +3635,78 @@
           <a:p/>
         </p:txBody>
       </p:sp>
+      <p:pic>
+        <p:nvPicPr>
+          <p:cNvPr id="7" name="Picture 6" descr="client_logo.png"/>
+          <p:cNvPicPr>
+            <a:picLocks noChangeAspect="1"/>
+          </p:cNvPicPr>
+          <p:nvPr/>
+        </p:nvPicPr>
+        <p:blipFill>
+          <a:blip r:embed="rId2"/>
+          <a:stretch>
+            <a:fillRect/>
+          </a:stretch>
+        </p:blipFill>
+        <p:spPr>
+          <a:xfrm>
+            <a:off x="2180492" y="171206"/>
+            <a:ext cx="3978520" cy="1314694"/>
+          </a:xfrm>
+          <a:prstGeom prst="rect">
+            <a:avLst/>
+          </a:prstGeom>
+        </p:spPr>
+      </p:pic>
+      <p:pic>
+        <p:nvPicPr>
+          <p:cNvPr id="8" name="Picture 7" descr="consulting_company_logo.png"/>
+          <p:cNvPicPr>
+            <a:picLocks noChangeAspect="1"/>
+          </p:cNvPicPr>
+          <p:nvPr/>
+        </p:nvPicPr>
+        <p:blipFill>
+          <a:blip r:embed="rId3"/>
+          <a:stretch>
+            <a:fillRect/>
+          </a:stretch>
+        </p:blipFill>
+        <p:spPr>
+          <a:xfrm>
+            <a:off x="313592" y="4536078"/>
+            <a:ext cx="2164114" cy="529698"/>
+          </a:xfrm>
+          <a:prstGeom prst="rect">
+            <a:avLst/>
+          </a:prstGeom>
+        </p:spPr>
+      </p:pic>
+      <p:pic>
+        <p:nvPicPr>
+          <p:cNvPr id="9" name="Picture 8" descr="eo-framework-logo-real.png"/>
+          <p:cNvPicPr>
+            <a:picLocks noChangeAspect="1"/>
+          </p:cNvPicPr>
+          <p:nvPr/>
+        </p:nvPicPr>
+        <p:blipFill>
+          <a:blip r:embed="rId4"/>
+          <a:stretch>
+            <a:fillRect/>
+          </a:stretch>
+        </p:blipFill>
+        <p:spPr>
+          <a:xfrm>
+            <a:off x="6684264" y="4535424"/>
+            <a:ext cx="2139696" cy="530352"/>
+          </a:xfrm>
+          <a:prstGeom prst="rect">
+            <a:avLst/>
+          </a:prstGeom>
+        </p:spPr>
+      </p:pic>
     </p:spTree>
   </p:cSld>
   <p:clrMapOvr>
@@ -3619,18 +3727,6 @@
       <p:grpSpPr/>
       <p:sp>
         <p:nvSpPr>
-          <p:cNvPr id="2" name="Picture Placeholder 1"/>
-          <p:cNvSpPr>
-            <a:spLocks noGrp="1"/>
-          </p:cNvSpPr>
-          <p:nvPr>
-            <p:ph type="pic" idx="14" sz="quarter"/>
-          </p:nvPr>
-        </p:nvSpPr>
-        <p:spPr/>
-      </p:sp>
-      <p:sp>
-        <p:nvSpPr>
           <p:cNvPr id="3" name="Text Placeholder 2"/>
           <p:cNvSpPr>
             <a:spLocks noGrp="1"/>
@@ -3762,6 +3858,30 @@
           </a:p>
         </p:txBody>
       </p:sp>
+      <p:pic>
+        <p:nvPicPr>
+          <p:cNvPr id="7" name="Picture 6" descr="consulting_company_logo.png"/>
+          <p:cNvPicPr>
+            <a:picLocks noChangeAspect="1"/>
+          </p:cNvPicPr>
+          <p:nvPr/>
+        </p:nvPicPr>
+        <p:blipFill>
+          <a:blip r:embed="rId2"/>
+          <a:stretch>
+            <a:fillRect/>
+          </a:stretch>
+        </p:blipFill>
+        <p:spPr>
+          <a:xfrm>
+            <a:off x="313592" y="4536078"/>
+            <a:ext cx="2121877" cy="529698"/>
+          </a:xfrm>
+          <a:prstGeom prst="rect">
+            <a:avLst/>
+          </a:prstGeom>
+        </p:spPr>
+      </p:pic>
     </p:spTree>
   </p:cSld>
   <p:clrMapOvr>
@@ -3780,18 +3900,6 @@
         <p:nvPr/>
       </p:nvGrpSpPr>
       <p:grpSpPr/>
-      <p:sp>
-        <p:nvSpPr>
-          <p:cNvPr id="2" name="Picture Placeholder 1"/>
-          <p:cNvSpPr>
-            <a:spLocks noGrp="1"/>
-          </p:cNvSpPr>
-          <p:nvPr>
-            <p:ph type="pic" idx="13" sz="quarter"/>
-          </p:nvPr>
-        </p:nvSpPr>
-        <p:spPr/>
-      </p:sp>
       <p:sp>
         <p:nvSpPr>
           <p:cNvPr id="3" name="Text Placeholder 2"/>
@@ -4628,6 +4736,30 @@
           </a:p>
         </p:txBody>
       </p:sp>
+      <p:pic>
+        <p:nvPicPr>
+          <p:cNvPr id="6" name="Picture 5" descr="consulting_company_logo.png"/>
+          <p:cNvPicPr>
+            <a:picLocks noChangeAspect="1"/>
+          </p:cNvPicPr>
+          <p:nvPr/>
+        </p:nvPicPr>
+        <p:blipFill>
+          <a:blip r:embed="rId2"/>
+          <a:stretch>
+            <a:fillRect/>
+          </a:stretch>
+        </p:blipFill>
+        <p:spPr>
+          <a:xfrm>
+            <a:off x="313592" y="4536078"/>
+            <a:ext cx="2126273" cy="529698"/>
+          </a:xfrm>
+          <a:prstGeom prst="rect">
+            <a:avLst/>
+          </a:prstGeom>
+        </p:spPr>
+      </p:pic>
     </p:spTree>
   </p:cSld>
   <p:clrMapOvr>
@@ -4646,18 +4778,6 @@
         <p:nvPr/>
       </p:nvGrpSpPr>
       <p:grpSpPr/>
-      <p:sp>
-        <p:nvSpPr>
-          <p:cNvPr id="2" name="Picture Placeholder 1"/>
-          <p:cNvSpPr>
-            <a:spLocks noGrp="1"/>
-          </p:cNvSpPr>
-          <p:nvPr>
-            <p:ph type="pic" idx="14" sz="quarter"/>
-          </p:nvPr>
-        </p:nvSpPr>
-        <p:spPr/>
-      </p:sp>
       <p:sp>
         <p:nvSpPr>
           <p:cNvPr id="3" name="Text Placeholder 2"/>
@@ -4805,6 +4925,30 @@
           </a:ln>
         </p:spPr>
       </p:pic>
+      <p:pic>
+        <p:nvPicPr>
+          <p:cNvPr id="8" name="Picture 7" descr="consulting_company_logo.png"/>
+          <p:cNvPicPr>
+            <a:picLocks noChangeAspect="1"/>
+          </p:cNvPicPr>
+          <p:nvPr/>
+        </p:nvPicPr>
+        <p:blipFill>
+          <a:blip r:embed="rId3"/>
+          <a:stretch>
+            <a:fillRect/>
+          </a:stretch>
+        </p:blipFill>
+        <p:spPr>
+          <a:xfrm>
+            <a:off x="313592" y="4536078"/>
+            <a:ext cx="2130670" cy="529698"/>
+          </a:xfrm>
+          <a:prstGeom prst="rect">
+            <a:avLst/>
+          </a:prstGeom>
+        </p:spPr>
+      </p:pic>
     </p:spTree>
   </p:cSld>
   <p:clrMapOvr>
@@ -4825,18 +4969,6 @@
       <p:grpSpPr/>
       <p:sp>
         <p:nvSpPr>
-          <p:cNvPr id="2" name="Picture Placeholder 1"/>
-          <p:cNvSpPr>
-            <a:spLocks noGrp="1"/>
-          </p:cNvSpPr>
-          <p:nvPr>
-            <p:ph type="pic" idx="13" sz="quarter"/>
-          </p:nvPr>
-        </p:nvSpPr>
-        <p:spPr/>
-      </p:sp>
-      <p:sp>
-        <p:nvSpPr>
           <p:cNvPr id="3" name="Text Placeholder 2"/>
           <p:cNvSpPr>
             <a:spLocks noGrp="1"/>
@@ -4977,6 +5109,30 @@
           </a:p>
         </p:txBody>
       </p:sp>
+      <p:pic>
+        <p:nvPicPr>
+          <p:cNvPr id="6" name="Picture 5" descr="consulting_company_logo.png"/>
+          <p:cNvPicPr>
+            <a:picLocks noChangeAspect="1"/>
+          </p:cNvPicPr>
+          <p:nvPr/>
+        </p:nvPicPr>
+        <p:blipFill>
+          <a:blip r:embed="rId2"/>
+          <a:stretch>
+            <a:fillRect/>
+          </a:stretch>
+        </p:blipFill>
+        <p:spPr>
+          <a:xfrm>
+            <a:off x="313593" y="4536078"/>
+            <a:ext cx="2143858" cy="529698"/>
+          </a:xfrm>
+          <a:prstGeom prst="rect">
+            <a:avLst/>
+          </a:prstGeom>
+        </p:spPr>
+      </p:pic>
     </p:spTree>
   </p:cSld>
   <p:clrMapOvr>
@@ -4995,18 +5151,6 @@
         <p:nvPr/>
       </p:nvGrpSpPr>
       <p:grpSpPr/>
-      <p:sp>
-        <p:nvSpPr>
-          <p:cNvPr id="2" name="Picture Placeholder 1"/>
-          <p:cNvSpPr>
-            <a:spLocks noGrp="1"/>
-          </p:cNvSpPr>
-          <p:nvPr>
-            <p:ph type="pic" idx="13" sz="quarter"/>
-          </p:nvPr>
-        </p:nvSpPr>
-        <p:spPr/>
-      </p:sp>
       <p:sp>
         <p:nvSpPr>
           <p:cNvPr id="3" name="Text Placeholder 2"/>
@@ -5384,6 +5528,30 @@
           </a:p>
         </p:txBody>
       </p:sp>
+      <p:pic>
+        <p:nvPicPr>
+          <p:cNvPr id="6" name="Picture 5" descr="consulting_company_logo.png"/>
+          <p:cNvPicPr>
+            <a:picLocks noChangeAspect="1"/>
+          </p:cNvPicPr>
+          <p:nvPr/>
+        </p:nvPicPr>
+        <p:blipFill>
+          <a:blip r:embed="rId2"/>
+          <a:stretch>
+            <a:fillRect/>
+          </a:stretch>
+        </p:blipFill>
+        <p:spPr>
+          <a:xfrm>
+            <a:off x="313592" y="4536078"/>
+            <a:ext cx="2126273" cy="529698"/>
+          </a:xfrm>
+          <a:prstGeom prst="rect">
+            <a:avLst/>
+          </a:prstGeom>
+        </p:spPr>
+      </p:pic>
     </p:spTree>
   </p:cSld>
   <p:clrMapOvr>
@@ -5404,18 +5572,6 @@
       <p:grpSpPr/>
       <p:sp>
         <p:nvSpPr>
-          <p:cNvPr id="2" name="Picture Placeholder 1"/>
-          <p:cNvSpPr>
-            <a:spLocks noGrp="1"/>
-          </p:cNvSpPr>
-          <p:nvPr>
-            <p:ph type="pic" idx="13" sz="quarter"/>
-          </p:nvPr>
-        </p:nvSpPr>
-        <p:spPr/>
-      </p:sp>
-      <p:sp>
-        <p:nvSpPr>
           <p:cNvPr id="3" name="Text Placeholder 2"/>
           <p:cNvSpPr>
             <a:spLocks noGrp="1"/>
@@ -5545,6 +5701,30 @@
           </a:p>
         </p:txBody>
       </p:sp>
+      <p:pic>
+        <p:nvPicPr>
+          <p:cNvPr id="6" name="Picture 5" descr="consulting_company_logo.png"/>
+          <p:cNvPicPr>
+            <a:picLocks noChangeAspect="1"/>
+          </p:cNvPicPr>
+          <p:nvPr/>
+        </p:nvPicPr>
+        <p:blipFill>
+          <a:blip r:embed="rId2"/>
+          <a:stretch>
+            <a:fillRect/>
+          </a:stretch>
+        </p:blipFill>
+        <p:spPr>
+          <a:xfrm>
+            <a:off x="313593" y="4536078"/>
+            <a:ext cx="2143858" cy="529698"/>
+          </a:xfrm>
+          <a:prstGeom prst="rect">
+            <a:avLst/>
+          </a:prstGeom>
+        </p:spPr>
+      </p:pic>
     </p:spTree>
   </p:cSld>
   <p:clrMapOvr>
@@ -5565,18 +5745,6 @@
       <p:grpSpPr/>
       <p:sp>
         <p:nvSpPr>
-          <p:cNvPr id="2" name="Picture Placeholder 1"/>
-          <p:cNvSpPr>
-            <a:spLocks noGrp="1"/>
-          </p:cNvSpPr>
-          <p:nvPr>
-            <p:ph type="pic" idx="14" sz="quarter"/>
-          </p:nvPr>
-        </p:nvSpPr>
-        <p:spPr/>
-      </p:sp>
-      <p:sp>
-        <p:nvSpPr>
           <p:cNvPr id="3" name="Text Placeholder 2"/>
           <p:cNvSpPr>
             <a:spLocks noGrp="1"/>
@@ -5720,6 +5888,30 @@
           </a:p>
         </p:txBody>
       </p:sp>
+      <p:pic>
+        <p:nvPicPr>
+          <p:cNvPr id="7" name="Picture 6" descr="consulting_company_logo.png"/>
+          <p:cNvPicPr>
+            <a:picLocks noChangeAspect="1"/>
+          </p:cNvPicPr>
+          <p:nvPr/>
+        </p:nvPicPr>
+        <p:blipFill>
+          <a:blip r:embed="rId2"/>
+          <a:stretch>
+            <a:fillRect/>
+          </a:stretch>
+        </p:blipFill>
+        <p:spPr>
+          <a:xfrm>
+            <a:off x="313592" y="4536078"/>
+            <a:ext cx="2121877" cy="529698"/>
+          </a:xfrm>
+          <a:prstGeom prst="rect">
+            <a:avLst/>
+          </a:prstGeom>
+        </p:spPr>
+      </p:pic>
     </p:spTree>
   </p:cSld>
   <p:clrMapOvr>
@@ -5738,18 +5930,6 @@
         <p:nvPr/>
       </p:nvGrpSpPr>
       <p:grpSpPr/>
-      <p:sp>
-        <p:nvSpPr>
-          <p:cNvPr id="2" name="Picture Placeholder 1"/>
-          <p:cNvSpPr>
-            <a:spLocks noGrp="1"/>
-          </p:cNvSpPr>
-          <p:nvPr>
-            <p:ph type="pic" idx="13" sz="quarter"/>
-          </p:nvPr>
-        </p:nvSpPr>
-        <p:spPr/>
-      </p:sp>
       <p:sp>
         <p:nvSpPr>
           <p:cNvPr id="3" name="Text Placeholder 2"/>
@@ -6588,6 +6768,30 @@
           </a:p>
         </p:txBody>
       </p:sp>
+      <p:pic>
+        <p:nvPicPr>
+          <p:cNvPr id="6" name="Picture 5" descr="consulting_company_logo.png"/>
+          <p:cNvPicPr>
+            <a:picLocks noChangeAspect="1"/>
+          </p:cNvPicPr>
+          <p:nvPr/>
+        </p:nvPicPr>
+        <p:blipFill>
+          <a:blip r:embed="rId2"/>
+          <a:stretch>
+            <a:fillRect/>
+          </a:stretch>
+        </p:blipFill>
+        <p:spPr>
+          <a:xfrm>
+            <a:off x="313592" y="4536078"/>
+            <a:ext cx="2126273" cy="529698"/>
+          </a:xfrm>
+          <a:prstGeom prst="rect">
+            <a:avLst/>
+          </a:prstGeom>
+        </p:spPr>
+      </p:pic>
     </p:spTree>
   </p:cSld>
   <p:clrMapOvr>

</xml_diff>